<commit_message>
Set up all loggers to write to same Logger file
</commit_message>
<xml_diff>
--- a/docs/Diagrams.pptx
+++ b/docs/Diagrams.pptx
@@ -21,8 +21,8 @@
     <a:defPPr>
       <a:defRPr lang="en-US"/>
     </a:defPPr>
-    <a:lvl1pPr marL="0" algn="l" defTabSz="914400" rtl="0" eaLnBrk="1" latinLnBrk="0" hangingPunct="1">
-      <a:defRPr sz="1800" kern="1200">
+    <a:lvl1pPr marL="0" algn="l" defTabSz="914163" rtl="0" eaLnBrk="1" latinLnBrk="0" hangingPunct="1">
+      <a:defRPr sz="1799" kern="1200">
         <a:solidFill>
           <a:schemeClr val="tx1"/>
         </a:solidFill>
@@ -31,8 +31,8 @@
         <a:cs typeface="+mn-cs"/>
       </a:defRPr>
     </a:lvl1pPr>
-    <a:lvl2pPr marL="457200" algn="l" defTabSz="914400" rtl="0" eaLnBrk="1" latinLnBrk="0" hangingPunct="1">
-      <a:defRPr sz="1800" kern="1200">
+    <a:lvl2pPr marL="457080" algn="l" defTabSz="914163" rtl="0" eaLnBrk="1" latinLnBrk="0" hangingPunct="1">
+      <a:defRPr sz="1799" kern="1200">
         <a:solidFill>
           <a:schemeClr val="tx1"/>
         </a:solidFill>
@@ -41,8 +41,8 @@
         <a:cs typeface="+mn-cs"/>
       </a:defRPr>
     </a:lvl2pPr>
-    <a:lvl3pPr marL="914400" algn="l" defTabSz="914400" rtl="0" eaLnBrk="1" latinLnBrk="0" hangingPunct="1">
-      <a:defRPr sz="1800" kern="1200">
+    <a:lvl3pPr marL="914163" algn="l" defTabSz="914163" rtl="0" eaLnBrk="1" latinLnBrk="0" hangingPunct="1">
+      <a:defRPr sz="1799" kern="1200">
         <a:solidFill>
           <a:schemeClr val="tx1"/>
         </a:solidFill>
@@ -51,8 +51,8 @@
         <a:cs typeface="+mn-cs"/>
       </a:defRPr>
     </a:lvl3pPr>
-    <a:lvl4pPr marL="1371600" algn="l" defTabSz="914400" rtl="0" eaLnBrk="1" latinLnBrk="0" hangingPunct="1">
-      <a:defRPr sz="1800" kern="1200">
+    <a:lvl4pPr marL="1371242" algn="l" defTabSz="914163" rtl="0" eaLnBrk="1" latinLnBrk="0" hangingPunct="1">
+      <a:defRPr sz="1799" kern="1200">
         <a:solidFill>
           <a:schemeClr val="tx1"/>
         </a:solidFill>
@@ -61,8 +61,8 @@
         <a:cs typeface="+mn-cs"/>
       </a:defRPr>
     </a:lvl4pPr>
-    <a:lvl5pPr marL="1828800" algn="l" defTabSz="914400" rtl="0" eaLnBrk="1" latinLnBrk="0" hangingPunct="1">
-      <a:defRPr sz="1800" kern="1200">
+    <a:lvl5pPr marL="1828323" algn="l" defTabSz="914163" rtl="0" eaLnBrk="1" latinLnBrk="0" hangingPunct="1">
+      <a:defRPr sz="1799" kern="1200">
         <a:solidFill>
           <a:schemeClr val="tx1"/>
         </a:solidFill>
@@ -71,8 +71,8 @@
         <a:cs typeface="+mn-cs"/>
       </a:defRPr>
     </a:lvl5pPr>
-    <a:lvl6pPr marL="2286000" algn="l" defTabSz="914400" rtl="0" eaLnBrk="1" latinLnBrk="0" hangingPunct="1">
-      <a:defRPr sz="1800" kern="1200">
+    <a:lvl6pPr marL="2285403" algn="l" defTabSz="914163" rtl="0" eaLnBrk="1" latinLnBrk="0" hangingPunct="1">
+      <a:defRPr sz="1799" kern="1200">
         <a:solidFill>
           <a:schemeClr val="tx1"/>
         </a:solidFill>
@@ -81,8 +81,8 @@
         <a:cs typeface="+mn-cs"/>
       </a:defRPr>
     </a:lvl6pPr>
-    <a:lvl7pPr marL="2743200" algn="l" defTabSz="914400" rtl="0" eaLnBrk="1" latinLnBrk="0" hangingPunct="1">
-      <a:defRPr sz="1800" kern="1200">
+    <a:lvl7pPr marL="2742486" algn="l" defTabSz="914163" rtl="0" eaLnBrk="1" latinLnBrk="0" hangingPunct="1">
+      <a:defRPr sz="1799" kern="1200">
         <a:solidFill>
           <a:schemeClr val="tx1"/>
         </a:solidFill>
@@ -91,8 +91,8 @@
         <a:cs typeface="+mn-cs"/>
       </a:defRPr>
     </a:lvl7pPr>
-    <a:lvl8pPr marL="3200400" algn="l" defTabSz="914400" rtl="0" eaLnBrk="1" latinLnBrk="0" hangingPunct="1">
-      <a:defRPr sz="1800" kern="1200">
+    <a:lvl8pPr marL="3199565" algn="l" defTabSz="914163" rtl="0" eaLnBrk="1" latinLnBrk="0" hangingPunct="1">
+      <a:defRPr sz="1799" kern="1200">
         <a:solidFill>
           <a:schemeClr val="tx1"/>
         </a:solidFill>
@@ -101,8 +101,8 @@
         <a:cs typeface="+mn-cs"/>
       </a:defRPr>
     </a:lvl8pPr>
-    <a:lvl9pPr marL="3657600" algn="l" defTabSz="914400" rtl="0" eaLnBrk="1" latinLnBrk="0" hangingPunct="1">
-      <a:defRPr sz="1800" kern="1200">
+    <a:lvl9pPr marL="3656644" algn="l" defTabSz="914163" rtl="0" eaLnBrk="1" latinLnBrk="0" hangingPunct="1">
+      <a:defRPr sz="1799" kern="1200">
         <a:solidFill>
           <a:schemeClr val="tx1"/>
         </a:solidFill>
@@ -115,12 +115,12 @@
   <p:extLst>
     <p:ext uri="{EFAFB233-063F-42B5-8137-9DF3F51BA10A}">
       <p15:sldGuideLst xmlns:p15="http://schemas.microsoft.com/office/powerpoint/2012/main">
-        <p15:guide id="1" orient="horz" pos="2160">
+        <p15:guide id="1" orient="horz" pos="2161" userDrawn="1">
           <p15:clr>
             <a:srgbClr val="A4A3A4"/>
           </p15:clr>
         </p15:guide>
-        <p15:guide id="2" pos="2880">
+        <p15:guide id="2" pos="2881" userDrawn="1">
           <p15:clr>
             <a:srgbClr val="A4A3A4"/>
           </p15:clr>
@@ -386,7 +386,7 @@
   </p:cSld>
   <p:clrMap bg1="lt1" tx1="dk1" bg2="lt2" tx2="dk2" accent1="accent1" accent2="accent2" accent3="accent3" accent4="accent4" accent5="accent5" accent6="accent6" hlink="hlink" folHlink="folHlink"/>
   <p:notesStyle>
-    <a:lvl1pPr marL="0" algn="l" defTabSz="914400" rtl="0" eaLnBrk="1" latinLnBrk="0" hangingPunct="1">
+    <a:lvl1pPr marL="0" algn="l" defTabSz="914163" rtl="0" eaLnBrk="1" latinLnBrk="0" hangingPunct="1">
       <a:defRPr sz="1200" kern="1200">
         <a:solidFill>
           <a:schemeClr val="tx1"/>
@@ -396,7 +396,7 @@
         <a:cs typeface="+mn-cs"/>
       </a:defRPr>
     </a:lvl1pPr>
-    <a:lvl2pPr marL="457200" algn="l" defTabSz="914400" rtl="0" eaLnBrk="1" latinLnBrk="0" hangingPunct="1">
+    <a:lvl2pPr marL="457080" algn="l" defTabSz="914163" rtl="0" eaLnBrk="1" latinLnBrk="0" hangingPunct="1">
       <a:defRPr sz="1200" kern="1200">
         <a:solidFill>
           <a:schemeClr val="tx1"/>
@@ -406,7 +406,7 @@
         <a:cs typeface="+mn-cs"/>
       </a:defRPr>
     </a:lvl2pPr>
-    <a:lvl3pPr marL="914400" algn="l" defTabSz="914400" rtl="0" eaLnBrk="1" latinLnBrk="0" hangingPunct="1">
+    <a:lvl3pPr marL="914163" algn="l" defTabSz="914163" rtl="0" eaLnBrk="1" latinLnBrk="0" hangingPunct="1">
       <a:defRPr sz="1200" kern="1200">
         <a:solidFill>
           <a:schemeClr val="tx1"/>
@@ -416,7 +416,7 @@
         <a:cs typeface="+mn-cs"/>
       </a:defRPr>
     </a:lvl3pPr>
-    <a:lvl4pPr marL="1371600" algn="l" defTabSz="914400" rtl="0" eaLnBrk="1" latinLnBrk="0" hangingPunct="1">
+    <a:lvl4pPr marL="1371242" algn="l" defTabSz="914163" rtl="0" eaLnBrk="1" latinLnBrk="0" hangingPunct="1">
       <a:defRPr sz="1200" kern="1200">
         <a:solidFill>
           <a:schemeClr val="tx1"/>
@@ -426,7 +426,7 @@
         <a:cs typeface="+mn-cs"/>
       </a:defRPr>
     </a:lvl4pPr>
-    <a:lvl5pPr marL="1828800" algn="l" defTabSz="914400" rtl="0" eaLnBrk="1" latinLnBrk="0" hangingPunct="1">
+    <a:lvl5pPr marL="1828323" algn="l" defTabSz="914163" rtl="0" eaLnBrk="1" latinLnBrk="0" hangingPunct="1">
       <a:defRPr sz="1200" kern="1200">
         <a:solidFill>
           <a:schemeClr val="tx1"/>
@@ -436,7 +436,7 @@
         <a:cs typeface="+mn-cs"/>
       </a:defRPr>
     </a:lvl5pPr>
-    <a:lvl6pPr marL="2286000" algn="l" defTabSz="914400" rtl="0" eaLnBrk="1" latinLnBrk="0" hangingPunct="1">
+    <a:lvl6pPr marL="2285403" algn="l" defTabSz="914163" rtl="0" eaLnBrk="1" latinLnBrk="0" hangingPunct="1">
       <a:defRPr sz="1200" kern="1200">
         <a:solidFill>
           <a:schemeClr val="tx1"/>
@@ -446,7 +446,7 @@
         <a:cs typeface="+mn-cs"/>
       </a:defRPr>
     </a:lvl6pPr>
-    <a:lvl7pPr marL="2743200" algn="l" defTabSz="914400" rtl="0" eaLnBrk="1" latinLnBrk="0" hangingPunct="1">
+    <a:lvl7pPr marL="2742486" algn="l" defTabSz="914163" rtl="0" eaLnBrk="1" latinLnBrk="0" hangingPunct="1">
       <a:defRPr sz="1200" kern="1200">
         <a:solidFill>
           <a:schemeClr val="tx1"/>
@@ -456,7 +456,7 @@
         <a:cs typeface="+mn-cs"/>
       </a:defRPr>
     </a:lvl7pPr>
-    <a:lvl8pPr marL="3200400" algn="l" defTabSz="914400" rtl="0" eaLnBrk="1" latinLnBrk="0" hangingPunct="1">
+    <a:lvl8pPr marL="3199565" algn="l" defTabSz="914163" rtl="0" eaLnBrk="1" latinLnBrk="0" hangingPunct="1">
       <a:defRPr sz="1200" kern="1200">
         <a:solidFill>
           <a:schemeClr val="tx1"/>
@@ -466,7 +466,7 @@
         <a:cs typeface="+mn-cs"/>
       </a:defRPr>
     </a:lvl8pPr>
-    <a:lvl9pPr marL="3657600" algn="l" defTabSz="914400" rtl="0" eaLnBrk="1" latinLnBrk="0" hangingPunct="1">
+    <a:lvl9pPr marL="3656644" algn="l" defTabSz="914163" rtl="0" eaLnBrk="1" latinLnBrk="0" hangingPunct="1">
       <a:defRPr sz="1200" kern="1200">
         <a:solidFill>
           <a:schemeClr val="tx1"/>
@@ -507,7 +507,12 @@
             <p:ph type="sldImg"/>
           </p:nvPr>
         </p:nvSpPr>
-        <p:spPr/>
+        <p:spPr>
+          <a:xfrm>
+            <a:off x="1143000" y="685800"/>
+            <a:ext cx="4572000" cy="3429000"/>
+          </a:xfrm>
+        </p:spPr>
       </p:sp>
       <p:sp>
         <p:nvSpPr>
@@ -591,7 +596,12 @@
             <p:ph type="sldImg"/>
           </p:nvPr>
         </p:nvSpPr>
-        <p:spPr/>
+        <p:spPr>
+          <a:xfrm>
+            <a:off x="1143000" y="685800"/>
+            <a:ext cx="4572000" cy="3429000"/>
+          </a:xfrm>
+        </p:spPr>
       </p:sp>
       <p:sp>
         <p:nvSpPr>
@@ -687,8 +697,8 @@
         </p:nvSpPr>
         <p:spPr>
           <a:xfrm>
-            <a:off x="685800" y="2130425"/>
-            <a:ext cx="7772400" cy="1470025"/>
+            <a:off x="685803" y="2130430"/>
+            <a:ext cx="7772401" cy="1470025"/>
           </a:xfrm>
         </p:spPr>
         <p:txBody>
@@ -714,8 +724,8 @@
         </p:nvSpPr>
         <p:spPr>
           <a:xfrm>
-            <a:off x="1371600" y="3886200"/>
-            <a:ext cx="6400800" cy="1752600"/>
+            <a:off x="1371602" y="3886202"/>
+            <a:ext cx="6400800" cy="1752599"/>
           </a:xfrm>
         </p:spPr>
         <p:txBody>
@@ -731,7 +741,7 @@
                 </a:solidFill>
               </a:defRPr>
             </a:lvl1pPr>
-            <a:lvl2pPr marL="457200" indent="0" algn="ctr">
+            <a:lvl2pPr marL="457242" indent="0" algn="ctr">
               <a:buNone/>
               <a:defRPr>
                 <a:solidFill>
@@ -741,7 +751,7 @@
                 </a:solidFill>
               </a:defRPr>
             </a:lvl2pPr>
-            <a:lvl3pPr marL="914400" indent="0" algn="ctr">
+            <a:lvl3pPr marL="914483" indent="0" algn="ctr">
               <a:buNone/>
               <a:defRPr>
                 <a:solidFill>
@@ -751,7 +761,7 @@
                 </a:solidFill>
               </a:defRPr>
             </a:lvl3pPr>
-            <a:lvl4pPr marL="1371600" indent="0" algn="ctr">
+            <a:lvl4pPr marL="1371726" indent="0" algn="ctr">
               <a:buNone/>
               <a:defRPr>
                 <a:solidFill>
@@ -761,7 +771,7 @@
                 </a:solidFill>
               </a:defRPr>
             </a:lvl4pPr>
-            <a:lvl5pPr marL="1828800" indent="0" algn="ctr">
+            <a:lvl5pPr marL="1828967" indent="0" algn="ctr">
               <a:buNone/>
               <a:defRPr>
                 <a:solidFill>
@@ -771,7 +781,7 @@
                 </a:solidFill>
               </a:defRPr>
             </a:lvl5pPr>
-            <a:lvl6pPr marL="2286000" indent="0" algn="ctr">
+            <a:lvl6pPr marL="2286209" indent="0" algn="ctr">
               <a:buNone/>
               <a:defRPr>
                 <a:solidFill>
@@ -781,7 +791,7 @@
                 </a:solidFill>
               </a:defRPr>
             </a:lvl6pPr>
-            <a:lvl7pPr marL="2743200" indent="0" algn="ctr">
+            <a:lvl7pPr marL="2743450" indent="0" algn="ctr">
               <a:buNone/>
               <a:defRPr>
                 <a:solidFill>
@@ -791,7 +801,7 @@
                 </a:solidFill>
               </a:defRPr>
             </a:lvl7pPr>
-            <a:lvl8pPr marL="3200400" indent="0" algn="ctr">
+            <a:lvl8pPr marL="3200692" indent="0" algn="ctr">
               <a:buNone/>
               <a:defRPr>
                 <a:solidFill>
@@ -801,7 +811,7 @@
                 </a:solidFill>
               </a:defRPr>
             </a:lvl8pPr>
-            <a:lvl9pPr marL="3657600" indent="0" algn="ctr">
+            <a:lvl9pPr marL="3657934" indent="0" algn="ctr">
               <a:buNone/>
               <a:defRPr>
                 <a:solidFill>
@@ -1095,7 +1105,7 @@
         </p:nvSpPr>
         <p:spPr>
           <a:xfrm>
-            <a:off x="6629400" y="274638"/>
+            <a:off x="6629399" y="274639"/>
             <a:ext cx="2057400" cy="5851525"/>
           </a:xfrm>
         </p:spPr>
@@ -1122,7 +1132,7 @@
         </p:nvSpPr>
         <p:spPr>
           <a:xfrm>
-            <a:off x="457200" y="274638"/>
+            <a:off x="457199" y="274639"/>
             <a:ext cx="6019800" cy="5851525"/>
           </a:xfrm>
         </p:spPr>
@@ -1441,8 +1451,8 @@
         </p:nvSpPr>
         <p:spPr>
           <a:xfrm>
-            <a:off x="722313" y="4406900"/>
-            <a:ext cx="7772400" cy="1362075"/>
+            <a:off x="722314" y="4406902"/>
+            <a:ext cx="7772401" cy="1362074"/>
           </a:xfrm>
         </p:spPr>
         <p:txBody>
@@ -1472,8 +1482,8 @@
         </p:nvSpPr>
         <p:spPr>
           <a:xfrm>
-            <a:off x="722313" y="2906713"/>
-            <a:ext cx="7772400" cy="1500187"/>
+            <a:off x="722314" y="2906717"/>
+            <a:ext cx="7772401" cy="1500187"/>
           </a:xfrm>
         </p:spPr>
         <p:txBody>
@@ -1489,9 +1499,9 @@
                 </a:solidFill>
               </a:defRPr>
             </a:lvl1pPr>
-            <a:lvl2pPr marL="457200" indent="0">
+            <a:lvl2pPr marL="457242" indent="0">
               <a:buNone/>
-              <a:defRPr sz="1800">
+              <a:defRPr sz="1802">
                 <a:solidFill>
                   <a:schemeClr val="tx1">
                     <a:tint val="75000"/>
@@ -1499,7 +1509,7 @@
                 </a:solidFill>
               </a:defRPr>
             </a:lvl2pPr>
-            <a:lvl3pPr marL="914400" indent="0">
+            <a:lvl3pPr marL="914483" indent="0">
               <a:buNone/>
               <a:defRPr sz="1600">
                 <a:solidFill>
@@ -1509,7 +1519,7 @@
                 </a:solidFill>
               </a:defRPr>
             </a:lvl3pPr>
-            <a:lvl4pPr marL="1371600" indent="0">
+            <a:lvl4pPr marL="1371726" indent="0">
               <a:buNone/>
               <a:defRPr sz="1400">
                 <a:solidFill>
@@ -1519,7 +1529,7 @@
                 </a:solidFill>
               </a:defRPr>
             </a:lvl4pPr>
-            <a:lvl5pPr marL="1828800" indent="0">
+            <a:lvl5pPr marL="1828967" indent="0">
               <a:buNone/>
               <a:defRPr sz="1400">
                 <a:solidFill>
@@ -1529,7 +1539,7 @@
                 </a:solidFill>
               </a:defRPr>
             </a:lvl5pPr>
-            <a:lvl6pPr marL="2286000" indent="0">
+            <a:lvl6pPr marL="2286209" indent="0">
               <a:buNone/>
               <a:defRPr sz="1400">
                 <a:solidFill>
@@ -1539,7 +1549,7 @@
                 </a:solidFill>
               </a:defRPr>
             </a:lvl6pPr>
-            <a:lvl7pPr marL="2743200" indent="0">
+            <a:lvl7pPr marL="2743450" indent="0">
               <a:buNone/>
               <a:defRPr sz="1400">
                 <a:solidFill>
@@ -1549,7 +1559,7 @@
                 </a:solidFill>
               </a:defRPr>
             </a:lvl7pPr>
-            <a:lvl8pPr marL="3200400" indent="0">
+            <a:lvl8pPr marL="3200692" indent="0">
               <a:buNone/>
               <a:defRPr sz="1400">
                 <a:solidFill>
@@ -1559,7 +1569,7 @@
                 </a:solidFill>
               </a:defRPr>
             </a:lvl8pPr>
-            <a:lvl9pPr marL="3657600" indent="0">
+            <a:lvl9pPr marL="3657934" indent="0">
               <a:buNone/>
               <a:defRPr sz="1400">
                 <a:solidFill>
@@ -1708,8 +1718,8 @@
         </p:nvSpPr>
         <p:spPr>
           <a:xfrm>
-            <a:off x="457200" y="1600200"/>
-            <a:ext cx="4038600" cy="4525963"/>
+            <a:off x="457202" y="1600201"/>
+            <a:ext cx="4038600" cy="4525962"/>
           </a:xfrm>
         </p:spPr>
         <p:txBody>
@@ -1725,22 +1735,22 @@
               <a:defRPr sz="2000"/>
             </a:lvl3pPr>
             <a:lvl4pPr>
-              <a:defRPr sz="1800"/>
+              <a:defRPr sz="1802"/>
             </a:lvl4pPr>
             <a:lvl5pPr>
-              <a:defRPr sz="1800"/>
+              <a:defRPr sz="1802"/>
             </a:lvl5pPr>
             <a:lvl6pPr>
-              <a:defRPr sz="1800"/>
+              <a:defRPr sz="1802"/>
             </a:lvl6pPr>
             <a:lvl7pPr>
-              <a:defRPr sz="1800"/>
+              <a:defRPr sz="1802"/>
             </a:lvl7pPr>
             <a:lvl8pPr>
-              <a:defRPr sz="1800"/>
+              <a:defRPr sz="1802"/>
             </a:lvl8pPr>
             <a:lvl9pPr>
-              <a:defRPr sz="1800"/>
+              <a:defRPr sz="1802"/>
             </a:lvl9pPr>
           </a:lstStyle>
           <a:p>
@@ -1792,8 +1802,8 @@
         </p:nvSpPr>
         <p:spPr>
           <a:xfrm>
-            <a:off x="4648200" y="1600200"/>
-            <a:ext cx="4038600" cy="4525963"/>
+            <a:off x="4648200" y="1600201"/>
+            <a:ext cx="4038600" cy="4525962"/>
           </a:xfrm>
         </p:spPr>
         <p:txBody>
@@ -1809,22 +1819,22 @@
               <a:defRPr sz="2000"/>
             </a:lvl3pPr>
             <a:lvl4pPr>
-              <a:defRPr sz="1800"/>
+              <a:defRPr sz="1802"/>
             </a:lvl4pPr>
             <a:lvl5pPr>
-              <a:defRPr sz="1800"/>
+              <a:defRPr sz="1802"/>
             </a:lvl5pPr>
             <a:lvl6pPr>
-              <a:defRPr sz="1800"/>
+              <a:defRPr sz="1802"/>
             </a:lvl6pPr>
             <a:lvl7pPr>
-              <a:defRPr sz="1800"/>
+              <a:defRPr sz="1802"/>
             </a:lvl7pPr>
             <a:lvl8pPr>
-              <a:defRPr sz="1800"/>
+              <a:defRPr sz="1802"/>
             </a:lvl8pPr>
             <a:lvl9pPr>
-              <a:defRPr sz="1800"/>
+              <a:defRPr sz="1802"/>
             </a:lvl9pPr>
           </a:lstStyle>
           <a:p>
@@ -1997,7 +2007,7 @@
         </p:nvSpPr>
         <p:spPr>
           <a:xfrm>
-            <a:off x="457200" y="1535113"/>
+            <a:off x="457203" y="1535113"/>
             <a:ext cx="4040188" cy="639762"/>
           </a:xfrm>
         </p:spPr>
@@ -2008,35 +2018,35 @@
               <a:buNone/>
               <a:defRPr sz="2400" b="1"/>
             </a:lvl1pPr>
-            <a:lvl2pPr marL="457200" indent="0">
+            <a:lvl2pPr marL="457242" indent="0">
               <a:buNone/>
               <a:defRPr sz="2000" b="1"/>
             </a:lvl2pPr>
-            <a:lvl3pPr marL="914400" indent="0">
+            <a:lvl3pPr marL="914483" indent="0">
               <a:buNone/>
-              <a:defRPr sz="1800" b="1"/>
+              <a:defRPr sz="1802" b="1"/>
             </a:lvl3pPr>
-            <a:lvl4pPr marL="1371600" indent="0">
+            <a:lvl4pPr marL="1371726" indent="0">
               <a:buNone/>
               <a:defRPr sz="1600" b="1"/>
             </a:lvl4pPr>
-            <a:lvl5pPr marL="1828800" indent="0">
+            <a:lvl5pPr marL="1828967" indent="0">
               <a:buNone/>
               <a:defRPr sz="1600" b="1"/>
             </a:lvl5pPr>
-            <a:lvl6pPr marL="2286000" indent="0">
+            <a:lvl6pPr marL="2286209" indent="0">
               <a:buNone/>
               <a:defRPr sz="1600" b="1"/>
             </a:lvl6pPr>
-            <a:lvl7pPr marL="2743200" indent="0">
+            <a:lvl7pPr marL="2743450" indent="0">
               <a:buNone/>
               <a:defRPr sz="1600" b="1"/>
             </a:lvl7pPr>
-            <a:lvl8pPr marL="3200400" indent="0">
+            <a:lvl8pPr marL="3200692" indent="0">
               <a:buNone/>
               <a:defRPr sz="1600" b="1"/>
             </a:lvl8pPr>
-            <a:lvl9pPr marL="3657600" indent="0">
+            <a:lvl9pPr marL="3657934" indent="0">
               <a:buNone/>
               <a:defRPr sz="1600" b="1"/>
             </a:lvl9pPr>
@@ -2062,7 +2072,7 @@
         </p:nvSpPr>
         <p:spPr>
           <a:xfrm>
-            <a:off x="457200" y="2174875"/>
+            <a:off x="457203" y="2174876"/>
             <a:ext cx="4040188" cy="3951288"/>
           </a:xfrm>
         </p:spPr>
@@ -2076,7 +2086,7 @@
               <a:defRPr sz="2000"/>
             </a:lvl2pPr>
             <a:lvl3pPr>
-              <a:defRPr sz="1800"/>
+              <a:defRPr sz="1802"/>
             </a:lvl3pPr>
             <a:lvl4pPr>
               <a:defRPr sz="1600"/>
@@ -2146,7 +2156,7 @@
         </p:nvSpPr>
         <p:spPr>
           <a:xfrm>
-            <a:off x="4645025" y="1535113"/>
+            <a:off x="4645029" y="1535113"/>
             <a:ext cx="4041775" cy="639762"/>
           </a:xfrm>
         </p:spPr>
@@ -2157,35 +2167,35 @@
               <a:buNone/>
               <a:defRPr sz="2400" b="1"/>
             </a:lvl1pPr>
-            <a:lvl2pPr marL="457200" indent="0">
+            <a:lvl2pPr marL="457242" indent="0">
               <a:buNone/>
               <a:defRPr sz="2000" b="1"/>
             </a:lvl2pPr>
-            <a:lvl3pPr marL="914400" indent="0">
+            <a:lvl3pPr marL="914483" indent="0">
               <a:buNone/>
-              <a:defRPr sz="1800" b="1"/>
+              <a:defRPr sz="1802" b="1"/>
             </a:lvl3pPr>
-            <a:lvl4pPr marL="1371600" indent="0">
+            <a:lvl4pPr marL="1371726" indent="0">
               <a:buNone/>
               <a:defRPr sz="1600" b="1"/>
             </a:lvl4pPr>
-            <a:lvl5pPr marL="1828800" indent="0">
+            <a:lvl5pPr marL="1828967" indent="0">
               <a:buNone/>
               <a:defRPr sz="1600" b="1"/>
             </a:lvl5pPr>
-            <a:lvl6pPr marL="2286000" indent="0">
+            <a:lvl6pPr marL="2286209" indent="0">
               <a:buNone/>
               <a:defRPr sz="1600" b="1"/>
             </a:lvl6pPr>
-            <a:lvl7pPr marL="2743200" indent="0">
+            <a:lvl7pPr marL="2743450" indent="0">
               <a:buNone/>
               <a:defRPr sz="1600" b="1"/>
             </a:lvl7pPr>
-            <a:lvl8pPr marL="3200400" indent="0">
+            <a:lvl8pPr marL="3200692" indent="0">
               <a:buNone/>
               <a:defRPr sz="1600" b="1"/>
             </a:lvl8pPr>
-            <a:lvl9pPr marL="3657600" indent="0">
+            <a:lvl9pPr marL="3657934" indent="0">
               <a:buNone/>
               <a:defRPr sz="1600" b="1"/>
             </a:lvl9pPr>
@@ -2211,7 +2221,7 @@
         </p:nvSpPr>
         <p:spPr>
           <a:xfrm>
-            <a:off x="4645025" y="2174875"/>
+            <a:off x="4645029" y="2174876"/>
             <a:ext cx="4041775" cy="3951288"/>
           </a:xfrm>
         </p:spPr>
@@ -2225,7 +2235,7 @@
               <a:defRPr sz="2000"/>
             </a:lvl2pPr>
             <a:lvl3pPr>
-              <a:defRPr sz="1800"/>
+              <a:defRPr sz="1802"/>
             </a:lvl3pPr>
             <a:lvl4pPr>
               <a:defRPr sz="1600"/>
@@ -2602,8 +2612,8 @@
         </p:nvSpPr>
         <p:spPr>
           <a:xfrm>
-            <a:off x="457200" y="273050"/>
-            <a:ext cx="3008313" cy="1162050"/>
+            <a:off x="457204" y="273052"/>
+            <a:ext cx="3008312" cy="1162050"/>
           </a:xfrm>
         </p:spPr>
         <p:txBody>
@@ -2633,8 +2643,8 @@
         </p:nvSpPr>
         <p:spPr>
           <a:xfrm>
-            <a:off x="3575050" y="273050"/>
-            <a:ext cx="5111750" cy="5853113"/>
+            <a:off x="3575053" y="273054"/>
+            <a:ext cx="5111751" cy="5853112"/>
           </a:xfrm>
         </p:spPr>
         <p:txBody>
@@ -2717,8 +2727,8 @@
         </p:nvSpPr>
         <p:spPr>
           <a:xfrm>
-            <a:off x="457200" y="1435100"/>
-            <a:ext cx="3008313" cy="4691063"/>
+            <a:off x="457204" y="1435101"/>
+            <a:ext cx="3008312" cy="4691062"/>
           </a:xfrm>
         </p:spPr>
         <p:txBody>
@@ -2728,35 +2738,35 @@
               <a:buNone/>
               <a:defRPr sz="1400"/>
             </a:lvl1pPr>
-            <a:lvl2pPr marL="457200" indent="0">
+            <a:lvl2pPr marL="457242" indent="0">
               <a:buNone/>
               <a:defRPr sz="1200"/>
             </a:lvl2pPr>
-            <a:lvl3pPr marL="914400" indent="0">
+            <a:lvl3pPr marL="914483" indent="0">
               <a:buNone/>
               <a:defRPr sz="1000"/>
             </a:lvl3pPr>
-            <a:lvl4pPr marL="1371600" indent="0">
+            <a:lvl4pPr marL="1371726" indent="0">
               <a:buNone/>
               <a:defRPr sz="900"/>
             </a:lvl4pPr>
-            <a:lvl5pPr marL="1828800" indent="0">
+            <a:lvl5pPr marL="1828967" indent="0">
               <a:buNone/>
               <a:defRPr sz="900"/>
             </a:lvl5pPr>
-            <a:lvl6pPr marL="2286000" indent="0">
+            <a:lvl6pPr marL="2286209" indent="0">
               <a:buNone/>
               <a:defRPr sz="900"/>
             </a:lvl6pPr>
-            <a:lvl7pPr marL="2743200" indent="0">
+            <a:lvl7pPr marL="2743450" indent="0">
               <a:buNone/>
               <a:defRPr sz="900"/>
             </a:lvl7pPr>
-            <a:lvl8pPr marL="3200400" indent="0">
+            <a:lvl8pPr marL="3200692" indent="0">
               <a:buNone/>
               <a:defRPr sz="900"/>
             </a:lvl8pPr>
-            <a:lvl9pPr marL="3657600" indent="0">
+            <a:lvl9pPr marL="3657934" indent="0">
               <a:buNone/>
               <a:defRPr sz="900"/>
             </a:lvl9pPr>
@@ -2877,8 +2887,8 @@
         </p:nvSpPr>
         <p:spPr>
           <a:xfrm>
-            <a:off x="1792288" y="4800600"/>
-            <a:ext cx="5486400" cy="566738"/>
+            <a:off x="1792289" y="4800599"/>
+            <a:ext cx="5486400" cy="566739"/>
           </a:xfrm>
         </p:spPr>
         <p:txBody>
@@ -2908,7 +2918,7 @@
         </p:nvSpPr>
         <p:spPr>
           <a:xfrm>
-            <a:off x="1792288" y="612775"/>
+            <a:off x="1792289" y="612779"/>
             <a:ext cx="5486400" cy="4114800"/>
           </a:xfrm>
         </p:spPr>
@@ -2919,35 +2929,35 @@
               <a:buNone/>
               <a:defRPr sz="3200"/>
             </a:lvl1pPr>
-            <a:lvl2pPr marL="457200" indent="0">
+            <a:lvl2pPr marL="457242" indent="0">
               <a:buNone/>
               <a:defRPr sz="2800"/>
             </a:lvl2pPr>
-            <a:lvl3pPr marL="914400" indent="0">
+            <a:lvl3pPr marL="914483" indent="0">
               <a:buNone/>
               <a:defRPr sz="2400"/>
             </a:lvl3pPr>
-            <a:lvl4pPr marL="1371600" indent="0">
+            <a:lvl4pPr marL="1371726" indent="0">
               <a:buNone/>
               <a:defRPr sz="2000"/>
             </a:lvl4pPr>
-            <a:lvl5pPr marL="1828800" indent="0">
+            <a:lvl5pPr marL="1828967" indent="0">
               <a:buNone/>
               <a:defRPr sz="2000"/>
             </a:lvl5pPr>
-            <a:lvl6pPr marL="2286000" indent="0">
+            <a:lvl6pPr marL="2286209" indent="0">
               <a:buNone/>
               <a:defRPr sz="2000"/>
             </a:lvl6pPr>
-            <a:lvl7pPr marL="2743200" indent="0">
+            <a:lvl7pPr marL="2743450" indent="0">
               <a:buNone/>
               <a:defRPr sz="2000"/>
             </a:lvl7pPr>
-            <a:lvl8pPr marL="3200400" indent="0">
+            <a:lvl8pPr marL="3200692" indent="0">
               <a:buNone/>
               <a:defRPr sz="2000"/>
             </a:lvl8pPr>
-            <a:lvl9pPr marL="3657600" indent="0">
+            <a:lvl9pPr marL="3657934" indent="0">
               <a:buNone/>
               <a:defRPr sz="2000"/>
             </a:lvl9pPr>
@@ -2969,7 +2979,7 @@
         </p:nvSpPr>
         <p:spPr>
           <a:xfrm>
-            <a:off x="1792288" y="5367338"/>
+            <a:off x="1792289" y="5367338"/>
             <a:ext cx="5486400" cy="804862"/>
           </a:xfrm>
         </p:spPr>
@@ -2980,35 +2990,35 @@
               <a:buNone/>
               <a:defRPr sz="1400"/>
             </a:lvl1pPr>
-            <a:lvl2pPr marL="457200" indent="0">
+            <a:lvl2pPr marL="457242" indent="0">
               <a:buNone/>
               <a:defRPr sz="1200"/>
             </a:lvl2pPr>
-            <a:lvl3pPr marL="914400" indent="0">
+            <a:lvl3pPr marL="914483" indent="0">
               <a:buNone/>
               <a:defRPr sz="1000"/>
             </a:lvl3pPr>
-            <a:lvl4pPr marL="1371600" indent="0">
+            <a:lvl4pPr marL="1371726" indent="0">
               <a:buNone/>
               <a:defRPr sz="900"/>
             </a:lvl4pPr>
-            <a:lvl5pPr marL="1828800" indent="0">
+            <a:lvl5pPr marL="1828967" indent="0">
               <a:buNone/>
               <a:defRPr sz="900"/>
             </a:lvl5pPr>
-            <a:lvl6pPr marL="2286000" indent="0">
+            <a:lvl6pPr marL="2286209" indent="0">
               <a:buNone/>
               <a:defRPr sz="900"/>
             </a:lvl6pPr>
-            <a:lvl7pPr marL="2743200" indent="0">
+            <a:lvl7pPr marL="2743450" indent="0">
               <a:buNone/>
               <a:defRPr sz="900"/>
             </a:lvl7pPr>
-            <a:lvl8pPr marL="3200400" indent="0">
+            <a:lvl8pPr marL="3200692" indent="0">
               <a:buNone/>
               <a:defRPr sz="900"/>
             </a:lvl8pPr>
-            <a:lvl9pPr marL="3657600" indent="0">
+            <a:lvl9pPr marL="3657934" indent="0">
               <a:buNone/>
               <a:defRPr sz="900"/>
             </a:lvl9pPr>
@@ -3134,8 +3144,8 @@
         </p:nvSpPr>
         <p:spPr>
           <a:xfrm>
-            <a:off x="457200" y="274638"/>
-            <a:ext cx="8229600" cy="1143000"/>
+            <a:off x="457202" y="274641"/>
+            <a:ext cx="8229600" cy="1143001"/>
           </a:xfrm>
           <a:prstGeom prst="rect">
             <a:avLst/>
@@ -3166,8 +3176,8 @@
         </p:nvSpPr>
         <p:spPr>
           <a:xfrm>
-            <a:off x="457200" y="1600200"/>
-            <a:ext cx="8229600" cy="4525963"/>
+            <a:off x="457202" y="1600201"/>
+            <a:ext cx="8229600" cy="4525962"/>
           </a:xfrm>
           <a:prstGeom prst="rect">
             <a:avLst/>
@@ -3227,8 +3237,8 @@
         </p:nvSpPr>
         <p:spPr>
           <a:xfrm>
-            <a:off x="457200" y="6356350"/>
-            <a:ext cx="2133600" cy="365125"/>
+            <a:off x="457202" y="6356352"/>
+            <a:ext cx="2133601" cy="365126"/>
           </a:xfrm>
           <a:prstGeom prst="rect">
             <a:avLst/>
@@ -3268,8 +3278,8 @@
         </p:nvSpPr>
         <p:spPr>
           <a:xfrm>
-            <a:off x="3124200" y="6356350"/>
-            <a:ext cx="2895600" cy="365125"/>
+            <a:off x="3124200" y="6356352"/>
+            <a:ext cx="2895600" cy="365126"/>
           </a:xfrm>
           <a:prstGeom prst="rect">
             <a:avLst/>
@@ -3305,8 +3315,8 @@
         </p:nvSpPr>
         <p:spPr>
           <a:xfrm>
-            <a:off x="6553200" y="6356350"/>
-            <a:ext cx="2133600" cy="365125"/>
+            <a:off x="6553202" y="6356352"/>
+            <a:ext cx="2133601" cy="365126"/>
           </a:xfrm>
           <a:prstGeom prst="rect">
             <a:avLst/>
@@ -3357,7 +3367,7 @@
   </p:sldLayoutIdLst>
   <p:txStyles>
     <p:titleStyle>
-      <a:lvl1pPr algn="ctr" defTabSz="914400" rtl="0" eaLnBrk="1" latinLnBrk="0" hangingPunct="1">
+      <a:lvl1pPr algn="ctr" defTabSz="914483" rtl="0" eaLnBrk="1" latinLnBrk="0" hangingPunct="1">
         <a:spcBef>
           <a:spcPct val="0"/>
         </a:spcBef>
@@ -3373,7 +3383,7 @@
       </a:lvl1pPr>
     </p:titleStyle>
     <p:bodyStyle>
-      <a:lvl1pPr marL="342900" indent="-342900" algn="l" defTabSz="914400" rtl="0" eaLnBrk="1" latinLnBrk="0" hangingPunct="1">
+      <a:lvl1pPr marL="342931" indent="-342931" algn="l" defTabSz="914483" rtl="0" eaLnBrk="1" latinLnBrk="0" hangingPunct="1">
         <a:spcBef>
           <a:spcPct val="20000"/>
         </a:spcBef>
@@ -3388,7 +3398,7 @@
           <a:cs typeface="+mn-cs"/>
         </a:defRPr>
       </a:lvl1pPr>
-      <a:lvl2pPr marL="742950" indent="-285750" algn="l" defTabSz="914400" rtl="0" eaLnBrk="1" latinLnBrk="0" hangingPunct="1">
+      <a:lvl2pPr marL="743017" indent="-285776" algn="l" defTabSz="914483" rtl="0" eaLnBrk="1" latinLnBrk="0" hangingPunct="1">
         <a:spcBef>
           <a:spcPct val="20000"/>
         </a:spcBef>
@@ -3403,7 +3413,7 @@
           <a:cs typeface="+mn-cs"/>
         </a:defRPr>
       </a:lvl2pPr>
-      <a:lvl3pPr marL="1143000" indent="-228600" algn="l" defTabSz="914400" rtl="0" eaLnBrk="1" latinLnBrk="0" hangingPunct="1">
+      <a:lvl3pPr marL="1143105" indent="-228620" algn="l" defTabSz="914483" rtl="0" eaLnBrk="1" latinLnBrk="0" hangingPunct="1">
         <a:spcBef>
           <a:spcPct val="20000"/>
         </a:spcBef>
@@ -3418,7 +3428,7 @@
           <a:cs typeface="+mn-cs"/>
         </a:defRPr>
       </a:lvl3pPr>
-      <a:lvl4pPr marL="1600200" indent="-228600" algn="l" defTabSz="914400" rtl="0" eaLnBrk="1" latinLnBrk="0" hangingPunct="1">
+      <a:lvl4pPr marL="1600346" indent="-228620" algn="l" defTabSz="914483" rtl="0" eaLnBrk="1" latinLnBrk="0" hangingPunct="1">
         <a:spcBef>
           <a:spcPct val="20000"/>
         </a:spcBef>
@@ -3433,7 +3443,7 @@
           <a:cs typeface="+mn-cs"/>
         </a:defRPr>
       </a:lvl4pPr>
-      <a:lvl5pPr marL="2057400" indent="-228600" algn="l" defTabSz="914400" rtl="0" eaLnBrk="1" latinLnBrk="0" hangingPunct="1">
+      <a:lvl5pPr marL="2057588" indent="-228620" algn="l" defTabSz="914483" rtl="0" eaLnBrk="1" latinLnBrk="0" hangingPunct="1">
         <a:spcBef>
           <a:spcPct val="20000"/>
         </a:spcBef>
@@ -3448,7 +3458,7 @@
           <a:cs typeface="+mn-cs"/>
         </a:defRPr>
       </a:lvl5pPr>
-      <a:lvl6pPr marL="2514600" indent="-228600" algn="l" defTabSz="914400" rtl="0" eaLnBrk="1" latinLnBrk="0" hangingPunct="1">
+      <a:lvl6pPr marL="2514829" indent="-228620" algn="l" defTabSz="914483" rtl="0" eaLnBrk="1" latinLnBrk="0" hangingPunct="1">
         <a:spcBef>
           <a:spcPct val="20000"/>
         </a:spcBef>
@@ -3463,7 +3473,7 @@
           <a:cs typeface="+mn-cs"/>
         </a:defRPr>
       </a:lvl6pPr>
-      <a:lvl7pPr marL="2971800" indent="-228600" algn="l" defTabSz="914400" rtl="0" eaLnBrk="1" latinLnBrk="0" hangingPunct="1">
+      <a:lvl7pPr marL="2972071" indent="-228620" algn="l" defTabSz="914483" rtl="0" eaLnBrk="1" latinLnBrk="0" hangingPunct="1">
         <a:spcBef>
           <a:spcPct val="20000"/>
         </a:spcBef>
@@ -3478,7 +3488,7 @@
           <a:cs typeface="+mn-cs"/>
         </a:defRPr>
       </a:lvl7pPr>
-      <a:lvl8pPr marL="3429000" indent="-228600" algn="l" defTabSz="914400" rtl="0" eaLnBrk="1" latinLnBrk="0" hangingPunct="1">
+      <a:lvl8pPr marL="3429313" indent="-228620" algn="l" defTabSz="914483" rtl="0" eaLnBrk="1" latinLnBrk="0" hangingPunct="1">
         <a:spcBef>
           <a:spcPct val="20000"/>
         </a:spcBef>
@@ -3493,7 +3503,7 @@
           <a:cs typeface="+mn-cs"/>
         </a:defRPr>
       </a:lvl8pPr>
-      <a:lvl9pPr marL="3886200" indent="-228600" algn="l" defTabSz="914400" rtl="0" eaLnBrk="1" latinLnBrk="0" hangingPunct="1">
+      <a:lvl9pPr marL="3886554" indent="-228620" algn="l" defTabSz="914483" rtl="0" eaLnBrk="1" latinLnBrk="0" hangingPunct="1">
         <a:spcBef>
           <a:spcPct val="20000"/>
         </a:spcBef>
@@ -3513,8 +3523,8 @@
       <a:defPPr>
         <a:defRPr lang="en-US"/>
       </a:defPPr>
-      <a:lvl1pPr marL="0" algn="l" defTabSz="914400" rtl="0" eaLnBrk="1" latinLnBrk="0" hangingPunct="1">
-        <a:defRPr sz="1800" kern="1200">
+      <a:lvl1pPr marL="0" algn="l" defTabSz="914483" rtl="0" eaLnBrk="1" latinLnBrk="0" hangingPunct="1">
+        <a:defRPr sz="1802" kern="1200">
           <a:solidFill>
             <a:schemeClr val="tx1"/>
           </a:solidFill>
@@ -3523,8 +3533,8 @@
           <a:cs typeface="+mn-cs"/>
         </a:defRPr>
       </a:lvl1pPr>
-      <a:lvl2pPr marL="457200" algn="l" defTabSz="914400" rtl="0" eaLnBrk="1" latinLnBrk="0" hangingPunct="1">
-        <a:defRPr sz="1800" kern="1200">
+      <a:lvl2pPr marL="457242" algn="l" defTabSz="914483" rtl="0" eaLnBrk="1" latinLnBrk="0" hangingPunct="1">
+        <a:defRPr sz="1802" kern="1200">
           <a:solidFill>
             <a:schemeClr val="tx1"/>
           </a:solidFill>
@@ -3533,8 +3543,8 @@
           <a:cs typeface="+mn-cs"/>
         </a:defRPr>
       </a:lvl2pPr>
-      <a:lvl3pPr marL="914400" algn="l" defTabSz="914400" rtl="0" eaLnBrk="1" latinLnBrk="0" hangingPunct="1">
-        <a:defRPr sz="1800" kern="1200">
+      <a:lvl3pPr marL="914483" algn="l" defTabSz="914483" rtl="0" eaLnBrk="1" latinLnBrk="0" hangingPunct="1">
+        <a:defRPr sz="1802" kern="1200">
           <a:solidFill>
             <a:schemeClr val="tx1"/>
           </a:solidFill>
@@ -3543,8 +3553,8 @@
           <a:cs typeface="+mn-cs"/>
         </a:defRPr>
       </a:lvl3pPr>
-      <a:lvl4pPr marL="1371600" algn="l" defTabSz="914400" rtl="0" eaLnBrk="1" latinLnBrk="0" hangingPunct="1">
-        <a:defRPr sz="1800" kern="1200">
+      <a:lvl4pPr marL="1371726" algn="l" defTabSz="914483" rtl="0" eaLnBrk="1" latinLnBrk="0" hangingPunct="1">
+        <a:defRPr sz="1802" kern="1200">
           <a:solidFill>
             <a:schemeClr val="tx1"/>
           </a:solidFill>
@@ -3553,8 +3563,8 @@
           <a:cs typeface="+mn-cs"/>
         </a:defRPr>
       </a:lvl4pPr>
-      <a:lvl5pPr marL="1828800" algn="l" defTabSz="914400" rtl="0" eaLnBrk="1" latinLnBrk="0" hangingPunct="1">
-        <a:defRPr sz="1800" kern="1200">
+      <a:lvl5pPr marL="1828967" algn="l" defTabSz="914483" rtl="0" eaLnBrk="1" latinLnBrk="0" hangingPunct="1">
+        <a:defRPr sz="1802" kern="1200">
           <a:solidFill>
             <a:schemeClr val="tx1"/>
           </a:solidFill>
@@ -3563,8 +3573,8 @@
           <a:cs typeface="+mn-cs"/>
         </a:defRPr>
       </a:lvl5pPr>
-      <a:lvl6pPr marL="2286000" algn="l" defTabSz="914400" rtl="0" eaLnBrk="1" latinLnBrk="0" hangingPunct="1">
-        <a:defRPr sz="1800" kern="1200">
+      <a:lvl6pPr marL="2286209" algn="l" defTabSz="914483" rtl="0" eaLnBrk="1" latinLnBrk="0" hangingPunct="1">
+        <a:defRPr sz="1802" kern="1200">
           <a:solidFill>
             <a:schemeClr val="tx1"/>
           </a:solidFill>
@@ -3573,8 +3583,8 @@
           <a:cs typeface="+mn-cs"/>
         </a:defRPr>
       </a:lvl6pPr>
-      <a:lvl7pPr marL="2743200" algn="l" defTabSz="914400" rtl="0" eaLnBrk="1" latinLnBrk="0" hangingPunct="1">
-        <a:defRPr sz="1800" kern="1200">
+      <a:lvl7pPr marL="2743450" algn="l" defTabSz="914483" rtl="0" eaLnBrk="1" latinLnBrk="0" hangingPunct="1">
+        <a:defRPr sz="1802" kern="1200">
           <a:solidFill>
             <a:schemeClr val="tx1"/>
           </a:solidFill>
@@ -3583,8 +3593,8 @@
           <a:cs typeface="+mn-cs"/>
         </a:defRPr>
       </a:lvl7pPr>
-      <a:lvl8pPr marL="3200400" algn="l" defTabSz="914400" rtl="0" eaLnBrk="1" latinLnBrk="0" hangingPunct="1">
-        <a:defRPr sz="1800" kern="1200">
+      <a:lvl8pPr marL="3200692" algn="l" defTabSz="914483" rtl="0" eaLnBrk="1" latinLnBrk="0" hangingPunct="1">
+        <a:defRPr sz="1802" kern="1200">
           <a:solidFill>
             <a:schemeClr val="tx1"/>
           </a:solidFill>
@@ -3593,8 +3603,8 @@
           <a:cs typeface="+mn-cs"/>
         </a:defRPr>
       </a:lvl8pPr>
-      <a:lvl9pPr marL="3657600" algn="l" defTabSz="914400" rtl="0" eaLnBrk="1" latinLnBrk="0" hangingPunct="1">
-        <a:defRPr sz="1800" kern="1200">
+      <a:lvl9pPr marL="3657934" algn="l" defTabSz="914483" rtl="0" eaLnBrk="1" latinLnBrk="0" hangingPunct="1">
+        <a:defRPr sz="1802" kern="1200">
           <a:solidFill>
             <a:schemeClr val="tx1"/>
           </a:solidFill>
@@ -3718,7 +3728,7 @@
         </p:nvCxnSpPr>
         <p:spPr>
           <a:xfrm rot="5400000" flipH="1" flipV="1">
-            <a:off x="2922972" y="2062094"/>
+            <a:off x="2922976" y="2062098"/>
             <a:ext cx="1412641" cy="711571"/>
           </a:xfrm>
           <a:prstGeom prst="bentConnector2">
@@ -3765,7 +3775,7 @@
         </p:nvCxnSpPr>
         <p:spPr>
           <a:xfrm rot="5400000">
-            <a:off x="6978413" y="3401936"/>
+            <a:off x="6978417" y="3401940"/>
             <a:ext cx="253555" cy="2883"/>
           </a:xfrm>
           <a:prstGeom prst="bentConnector3">
@@ -3806,7 +3816,7 @@
         </p:nvSpPr>
         <p:spPr>
           <a:xfrm>
-            <a:off x="339022" y="3929555"/>
+            <a:off x="339024" y="3929555"/>
             <a:ext cx="400979" cy="346760"/>
           </a:xfrm>
           <a:prstGeom prst="rect">
@@ -3865,7 +3875,7 @@
         </p:nvSpPr>
         <p:spPr>
           <a:xfrm>
-            <a:off x="1143973" y="3913809"/>
+            <a:off x="1143975" y="3913809"/>
             <a:ext cx="581331" cy="346760"/>
           </a:xfrm>
           <a:prstGeom prst="rect">
@@ -3979,7 +3989,7 @@
         </p:nvSpPr>
         <p:spPr>
           <a:xfrm>
-            <a:off x="2956145" y="2991149"/>
+            <a:off x="2956149" y="2991149"/>
             <a:ext cx="634723" cy="346760"/>
           </a:xfrm>
           <a:prstGeom prst="rect">
@@ -4269,7 +4279,7 @@
         </p:nvSpPr>
         <p:spPr>
           <a:xfrm>
-            <a:off x="2410207" y="4460471"/>
+            <a:off x="2410211" y="4460471"/>
             <a:ext cx="790193" cy="346760"/>
           </a:xfrm>
           <a:prstGeom prst="rect">
@@ -4331,7 +4341,7 @@
         </p:nvCxnSpPr>
         <p:spPr>
           <a:xfrm rot="10800000" flipV="1">
-            <a:off x="740001" y="4087189"/>
+            <a:off x="740001" y="4087191"/>
             <a:ext cx="403972" cy="15746"/>
           </a:xfrm>
           <a:prstGeom prst="bentConnector3">
@@ -4371,7 +4381,7 @@
         </p:nvCxnSpPr>
         <p:spPr>
           <a:xfrm rot="5400000" flipH="1" flipV="1">
-            <a:off x="2962964" y="3498849"/>
+            <a:off x="2962966" y="3498851"/>
             <a:ext cx="342611" cy="12700"/>
           </a:xfrm>
           <a:prstGeom prst="bentConnector3">
@@ -4415,7 +4425,7 @@
         </p:nvCxnSpPr>
         <p:spPr>
           <a:xfrm>
-            <a:off x="4648442" y="3918486"/>
+            <a:off x="4648446" y="3918488"/>
             <a:ext cx="424477" cy="607579"/>
           </a:xfrm>
           <a:prstGeom prst="bentConnector3">
@@ -4455,7 +4465,7 @@
         </p:nvCxnSpPr>
         <p:spPr>
           <a:xfrm rot="5400000" flipH="1" flipV="1">
-            <a:off x="7436346" y="3758388"/>
+            <a:off x="9128621" y="3758392"/>
             <a:ext cx="1323414" cy="203993"/>
           </a:xfrm>
           <a:prstGeom prst="bentConnector2">
@@ -4539,7 +4549,7 @@
         </p:nvCxnSpPr>
         <p:spPr>
           <a:xfrm>
-            <a:off x="7803052" y="4522091"/>
+            <a:off x="7803052" y="4522093"/>
             <a:ext cx="396998" cy="147089"/>
           </a:xfrm>
           <a:prstGeom prst="bentConnector3">
@@ -4622,7 +4632,7 @@
         </p:nvSpPr>
         <p:spPr>
           <a:xfrm>
-            <a:off x="7567004" y="4435401"/>
+            <a:off x="7567006" y="4435401"/>
             <a:ext cx="236048" cy="173380"/>
           </a:xfrm>
           <a:prstGeom prst="flowChartDecision">
@@ -4657,11 +4667,7 @@
           <a:lstStyle/>
           <a:p>
             <a:pPr algn="ctr"/>
-            <a:endParaRPr lang="en-US" sz="1050">
-              <a:solidFill>
-                <a:schemeClr val="dk1"/>
-              </a:solidFill>
-            </a:endParaRPr>
+            <a:endParaRPr lang="en-US" sz="1050"/>
           </a:p>
         </p:txBody>
       </p:sp>
@@ -4673,7 +4679,7 @@
         </p:nvSpPr>
         <p:spPr>
           <a:xfrm>
-            <a:off x="5992191" y="4439375"/>
+            <a:off x="5992193" y="4439375"/>
             <a:ext cx="236048" cy="173380"/>
           </a:xfrm>
           <a:prstGeom prst="flowChartDecision">
@@ -4760,7 +4766,7 @@
         </p:nvCxnSpPr>
         <p:spPr>
           <a:xfrm>
-            <a:off x="6228239" y="4526065"/>
+            <a:off x="6228241" y="4526065"/>
             <a:ext cx="409469" cy="0"/>
           </a:xfrm>
           <a:prstGeom prst="straightConnector1">
@@ -4848,7 +4854,7 @@
         </p:nvCxnSpPr>
         <p:spPr>
           <a:xfrm>
-            <a:off x="304800" y="3006041"/>
+            <a:off x="304800" y="3006043"/>
             <a:ext cx="6059002" cy="2307747"/>
           </a:xfrm>
           <a:prstGeom prst="bentConnector3">
@@ -4889,7 +4895,7 @@
         </p:nvSpPr>
         <p:spPr>
           <a:xfrm rot="10800000">
-            <a:off x="6964221" y="4953000"/>
+            <a:off x="6964221" y="4953002"/>
             <a:ext cx="270504" cy="175523"/>
           </a:xfrm>
           <a:prstGeom prst="triangle">
@@ -4932,7 +4938,7 @@
         </p:nvCxnSpPr>
         <p:spPr>
           <a:xfrm rot="5400000">
-            <a:off x="6974138" y="4824781"/>
+            <a:off x="6974142" y="4824785"/>
             <a:ext cx="253555" cy="2883"/>
           </a:xfrm>
           <a:prstGeom prst="bentConnector3">
@@ -4973,7 +4979,7 @@
         </p:nvSpPr>
         <p:spPr>
           <a:xfrm>
-            <a:off x="3985078" y="1356188"/>
+            <a:off x="3985080" y="1356190"/>
             <a:ext cx="1611867" cy="444640"/>
           </a:xfrm>
           <a:prstGeom prst="rect">
@@ -5135,7 +5141,7 @@
         </p:nvSpPr>
         <p:spPr>
           <a:xfrm flipH="1">
-            <a:off x="6142650" y="1849054"/>
+            <a:off x="6142652" y="1849054"/>
             <a:ext cx="1404109" cy="346760"/>
           </a:xfrm>
           <a:prstGeom prst="rect">
@@ -5179,7 +5185,7 @@
         </p:nvSpPr>
         <p:spPr>
           <a:xfrm rot="16200000">
-            <a:off x="5549453" y="1571491"/>
+            <a:off x="5549453" y="1571493"/>
             <a:ext cx="270504" cy="175523"/>
           </a:xfrm>
           <a:prstGeom prst="triangle">
@@ -5222,7 +5228,7 @@
         </p:nvCxnSpPr>
         <p:spPr>
           <a:xfrm flipV="1">
-            <a:off x="5772467" y="1627447"/>
+            <a:off x="5772469" y="1627447"/>
             <a:ext cx="370183" cy="31806"/>
           </a:xfrm>
           <a:prstGeom prst="bentConnector3">
@@ -5260,7 +5266,7 @@
         </p:nvCxnSpPr>
         <p:spPr>
           <a:xfrm flipV="1">
-            <a:off x="5772467" y="1232460"/>
+            <a:off x="5772469" y="1232462"/>
             <a:ext cx="370183" cy="426793"/>
           </a:xfrm>
           <a:prstGeom prst="bentConnector3">
@@ -5298,7 +5304,7 @@
         </p:nvCxnSpPr>
         <p:spPr>
           <a:xfrm>
-            <a:off x="5772467" y="1659253"/>
+            <a:off x="5772469" y="1659255"/>
             <a:ext cx="370183" cy="363181"/>
           </a:xfrm>
           <a:prstGeom prst="bentConnector3">
@@ -5333,7 +5339,7 @@
         </p:nvSpPr>
         <p:spPr>
           <a:xfrm flipH="1">
-            <a:off x="6142650" y="2244040"/>
+            <a:off x="6142652" y="2244040"/>
             <a:ext cx="1404109" cy="346760"/>
           </a:xfrm>
           <a:prstGeom prst="rect">
@@ -5380,7 +5386,7 @@
         </p:nvCxnSpPr>
         <p:spPr>
           <a:xfrm>
-            <a:off x="5772467" y="1659253"/>
+            <a:off x="5772469" y="1659255"/>
             <a:ext cx="370183" cy="758167"/>
           </a:xfrm>
           <a:prstGeom prst="bentConnector3">
@@ -5417,7 +5423,7 @@
         </p:nvCxnSpPr>
         <p:spPr>
           <a:xfrm rot="5400000" flipH="1" flipV="1">
-            <a:off x="2379866" y="2052366"/>
+            <a:off x="2379868" y="2052370"/>
             <a:ext cx="2132160" cy="1078307"/>
           </a:xfrm>
           <a:prstGeom prst="bentConnector2">
@@ -5456,7 +5462,7 @@
         </p:nvCxnSpPr>
         <p:spPr>
           <a:xfrm rot="5400000">
-            <a:off x="3213414" y="2790743"/>
+            <a:off x="3213416" y="2790743"/>
             <a:ext cx="1889726" cy="6348"/>
           </a:xfrm>
           <a:prstGeom prst="bentConnector3">
@@ -5497,7 +5503,7 @@
         </p:nvSpPr>
         <p:spPr>
           <a:xfrm flipH="1">
-            <a:off x="2637450" y="720040"/>
+            <a:off x="2637452" y="720040"/>
             <a:ext cx="1404109" cy="346760"/>
           </a:xfrm>
           <a:prstGeom prst="rect">
@@ -5544,7 +5550,7 @@
         </p:nvCxnSpPr>
         <p:spPr>
           <a:xfrm rot="16200000" flipV="1">
-            <a:off x="4184902" y="750077"/>
+            <a:off x="4184904" y="750079"/>
             <a:ext cx="462768" cy="749453"/>
           </a:xfrm>
           <a:prstGeom prst="bentConnector2">
@@ -5585,7 +5591,7 @@
         </p:nvCxnSpPr>
         <p:spPr>
           <a:xfrm flipV="1">
-            <a:off x="304800" y="893420"/>
+            <a:off x="304800" y="893422"/>
             <a:ext cx="2332650" cy="1763378"/>
           </a:xfrm>
           <a:prstGeom prst="bentConnector3">
@@ -5887,7 +5893,7 @@
         </p:nvSpPr>
         <p:spPr>
           <a:xfrm>
-            <a:off x="3775013" y="4455640"/>
+            <a:off x="3775012" y="4455640"/>
             <a:ext cx="929296" cy="346760"/>
           </a:xfrm>
           <a:prstGeom prst="rect">
@@ -5938,7 +5944,7 @@
         </p:nvCxnSpPr>
         <p:spPr>
           <a:xfrm flipV="1">
-            <a:off x="3200400" y="4629020"/>
+            <a:off x="3200404" y="4629024"/>
             <a:ext cx="574613" cy="4831"/>
           </a:xfrm>
           <a:prstGeom prst="bentConnector3">
@@ -5979,7 +5985,7 @@
         </p:nvCxnSpPr>
         <p:spPr>
           <a:xfrm flipV="1">
-            <a:off x="8107853" y="1199445"/>
+            <a:off x="8107853" y="1199447"/>
             <a:ext cx="0" cy="304800"/>
           </a:xfrm>
           <a:prstGeom prst="straightConnector1">
@@ -6020,7 +6026,7 @@
         </p:nvCxnSpPr>
         <p:spPr>
           <a:xfrm flipV="1">
-            <a:off x="8260253" y="1199445"/>
+            <a:off x="8260253" y="1199447"/>
             <a:ext cx="0" cy="304800"/>
           </a:xfrm>
           <a:prstGeom prst="straightConnector1">
@@ -6061,7 +6067,7 @@
         </p:nvCxnSpPr>
         <p:spPr>
           <a:xfrm flipV="1">
-            <a:off x="8412653" y="1199445"/>
+            <a:off x="8412653" y="1199447"/>
             <a:ext cx="0" cy="304800"/>
           </a:xfrm>
           <a:prstGeom prst="straightConnector1">
@@ -6225,7 +6231,7 @@
         </p:nvSpPr>
         <p:spPr>
           <a:xfrm>
-            <a:off x="228600" y="2656798"/>
+            <a:off x="228602" y="2656798"/>
             <a:ext cx="1746186" cy="346760"/>
           </a:xfrm>
           <a:prstGeom prst="rect">
@@ -6286,7 +6292,7 @@
         </p:nvCxnSpPr>
         <p:spPr>
           <a:xfrm rot="5400000" flipH="1" flipV="1">
-            <a:off x="88595" y="3478638"/>
+            <a:off x="88595" y="3478640"/>
             <a:ext cx="901834" cy="1"/>
           </a:xfrm>
           <a:prstGeom prst="bentConnector3">
@@ -6326,7 +6332,7 @@
         </p:nvSpPr>
         <p:spPr>
           <a:xfrm>
-            <a:off x="2410208" y="3700884"/>
+            <a:off x="2410208" y="3700886"/>
             <a:ext cx="790192" cy="442612"/>
           </a:xfrm>
           <a:prstGeom prst="rect">
@@ -6388,7 +6394,7 @@
         </p:nvCxnSpPr>
         <p:spPr>
           <a:xfrm>
-            <a:off x="2803553" y="4125851"/>
+            <a:off x="2803557" y="4125853"/>
             <a:ext cx="1751" cy="334620"/>
           </a:xfrm>
           <a:prstGeom prst="straightConnector1">
@@ -6426,7 +6432,7 @@
         </p:nvSpPr>
         <p:spPr>
           <a:xfrm>
-            <a:off x="386361" y="1995549"/>
+            <a:off x="386363" y="1995549"/>
             <a:ext cx="756639" cy="346760"/>
           </a:xfrm>
           <a:prstGeom prst="rect">
@@ -6566,7 +6572,7 @@
         </p:nvCxnSpPr>
         <p:spPr>
           <a:xfrm rot="5400000" flipH="1" flipV="1">
-            <a:off x="1024192" y="3114383"/>
+            <a:off x="1024194" y="3114383"/>
             <a:ext cx="192567" cy="6999"/>
           </a:xfrm>
           <a:prstGeom prst="bentConnector3">
@@ -6650,8 +6656,8 @@
         </p:nvCxnSpPr>
         <p:spPr>
           <a:xfrm rot="16200000" flipH="1">
-            <a:off x="1344934" y="3824104"/>
-            <a:ext cx="176402" cy="3007"/>
+            <a:off x="1344934" y="3824107"/>
+            <a:ext cx="176402" cy="3006"/>
           </a:xfrm>
           <a:prstGeom prst="bentConnector3">
             <a:avLst>
@@ -6693,7 +6699,7 @@
         </p:nvCxnSpPr>
         <p:spPr>
           <a:xfrm flipV="1">
-            <a:off x="1725304" y="4087188"/>
+            <a:off x="1725304" y="4087192"/>
             <a:ext cx="684904" cy="1"/>
           </a:xfrm>
           <a:prstGeom prst="bentConnector3">
@@ -6791,7 +6797,7 @@
         <p:spPr>
           <a:xfrm>
             <a:off x="7945556" y="2928939"/>
-            <a:ext cx="88232" cy="369332"/>
+            <a:ext cx="88232" cy="369204"/>
           </a:xfrm>
           <a:prstGeom prst="rect">
             <a:avLst/>
@@ -6805,7 +6811,7 @@
           <a:lstStyle/>
           <a:p>
             <a:r>
-              <a:rPr lang="en-US" dirty="0">
+              <a:rPr lang="en-US" sz="1781" dirty="0">
                 <a:solidFill>
                   <a:srgbClr val="7030A0"/>
                 </a:solidFill>
@@ -6949,7 +6955,7 @@
         </p:nvCxnSpPr>
         <p:spPr>
           <a:xfrm flipV="1">
-            <a:off x="4648200" y="3307690"/>
+            <a:off x="4648204" y="3307692"/>
             <a:ext cx="424477" cy="607579"/>
           </a:xfrm>
           <a:prstGeom prst="bentConnector3">
@@ -7049,7 +7055,7 @@
         </p:nvSpPr>
         <p:spPr>
           <a:xfrm>
-            <a:off x="6024672" y="3245130"/>
+            <a:off x="6024674" y="3245132"/>
             <a:ext cx="236048" cy="173380"/>
           </a:xfrm>
           <a:prstGeom prst="flowChartDecision">
@@ -7099,7 +7105,7 @@
         </p:nvCxnSpPr>
         <p:spPr>
           <a:xfrm rot="16200000" flipH="1">
-            <a:off x="6160964" y="3418691"/>
+            <a:off x="6160964" y="3418693"/>
             <a:ext cx="561296" cy="386423"/>
           </a:xfrm>
           <a:prstGeom prst="bentConnector2">
@@ -7208,7 +7214,7 @@
         </p:nvSpPr>
         <p:spPr>
           <a:xfrm rot="10800000">
-            <a:off x="6968496" y="3530155"/>
+            <a:off x="6968496" y="3530157"/>
             <a:ext cx="270504" cy="175523"/>
           </a:xfrm>
           <a:prstGeom prst="triangle">
@@ -7254,8 +7260,8 @@
         </p:nvSpPr>
         <p:spPr>
           <a:xfrm>
-            <a:off x="7960690" y="3440668"/>
-            <a:ext cx="88232" cy="369332"/>
+            <a:off x="7960690" y="3440670"/>
+            <a:ext cx="88232" cy="369204"/>
           </a:xfrm>
           <a:prstGeom prst="rect">
             <a:avLst/>
@@ -7269,7 +7275,7 @@
           <a:lstStyle/>
           <a:p>
             <a:r>
-              <a:rPr lang="en-US" dirty="0">
+              <a:rPr lang="en-US" sz="1781" dirty="0">
                 <a:solidFill>
                   <a:srgbClr val="7030A0"/>
                 </a:solidFill>
@@ -7407,7 +7413,7 @@
         </p:nvSpPr>
         <p:spPr>
           <a:xfrm>
-            <a:off x="1797214" y="2208798"/>
+            <a:off x="1797218" y="2208798"/>
             <a:ext cx="859535" cy="395870"/>
           </a:xfrm>
           <a:prstGeom prst="rect">
@@ -7521,7 +7527,7 @@
         </p:nvCxnSpPr>
         <p:spPr>
           <a:xfrm rot="16200000" flipH="1">
-            <a:off x="1614772" y="3838415"/>
+            <a:off x="1614774" y="3838415"/>
             <a:ext cx="1141903" cy="448967"/>
           </a:xfrm>
           <a:prstGeom prst="bentConnector2">
@@ -7565,7 +7571,7 @@
         </p:nvSpPr>
         <p:spPr>
           <a:xfrm>
-            <a:off x="1619032" y="4912420"/>
+            <a:off x="1619034" y="4912420"/>
             <a:ext cx="790193" cy="346760"/>
           </a:xfrm>
           <a:prstGeom prst="rect">
@@ -7630,7 +7636,7 @@
         </p:nvSpPr>
         <p:spPr>
           <a:xfrm>
-            <a:off x="2979453" y="4916258"/>
+            <a:off x="2979458" y="4916258"/>
             <a:ext cx="790193" cy="346760"/>
           </a:xfrm>
           <a:prstGeom prst="rect">
@@ -7747,7 +7753,7 @@
         </p:nvCxnSpPr>
         <p:spPr>
           <a:xfrm rot="10800000" flipH="1" flipV="1">
-            <a:off x="485524" y="1258184"/>
+            <a:off x="485526" y="1258184"/>
             <a:ext cx="1133507" cy="3827615"/>
           </a:xfrm>
           <a:prstGeom prst="bentConnector3">
@@ -7796,7 +7802,7 @@
         </p:nvCxnSpPr>
         <p:spPr>
           <a:xfrm rot="5400000" flipH="1" flipV="1">
-            <a:off x="1318343" y="1780688"/>
+            <a:off x="1318345" y="1780690"/>
             <a:ext cx="1303641" cy="489717"/>
           </a:xfrm>
           <a:prstGeom prst="bentConnector3">
@@ -7842,7 +7848,7 @@
         </p:nvSpPr>
         <p:spPr>
           <a:xfrm>
-            <a:off x="1799268" y="3081186"/>
+            <a:off x="1799272" y="3081186"/>
             <a:ext cx="859535" cy="395870"/>
           </a:xfrm>
           <a:prstGeom prst="rect">
@@ -7955,7 +7961,7 @@
         </p:nvSpPr>
         <p:spPr>
           <a:xfrm>
-            <a:off x="1785254" y="1373725"/>
+            <a:off x="1785256" y="1373725"/>
             <a:ext cx="859535" cy="395870"/>
           </a:xfrm>
           <a:prstGeom prst="rect">
@@ -8070,7 +8076,7 @@
         </p:nvCxnSpPr>
         <p:spPr>
           <a:xfrm>
-            <a:off x="2644789" y="1571660"/>
+            <a:off x="2644791" y="1571661"/>
             <a:ext cx="160515" cy="2129224"/>
           </a:xfrm>
           <a:prstGeom prst="bentConnector2">
@@ -8114,7 +8120,7 @@
         </p:nvSpPr>
         <p:spPr>
           <a:xfrm>
-            <a:off x="4589077" y="2208511"/>
+            <a:off x="4589081" y="2208511"/>
             <a:ext cx="634723" cy="346760"/>
           </a:xfrm>
           <a:prstGeom prst="rect">
@@ -8468,7 +8474,7 @@
         </p:nvCxnSpPr>
         <p:spPr>
           <a:xfrm rot="5400000" flipH="1" flipV="1">
-            <a:off x="1483237" y="2630634"/>
+            <a:off x="1483237" y="2630636"/>
             <a:ext cx="676376" cy="1"/>
           </a:xfrm>
           <a:prstGeom prst="bentConnector3">
@@ -8511,7 +8517,7 @@
         </p:nvCxnSpPr>
         <p:spPr>
           <a:xfrm>
-            <a:off x="3602504" y="2165896"/>
+            <a:off x="3602505" y="2165896"/>
             <a:ext cx="211370" cy="9488"/>
           </a:xfrm>
           <a:prstGeom prst="bentConnector3">
@@ -8562,7 +8568,7 @@
         </p:nvCxnSpPr>
         <p:spPr>
           <a:xfrm rot="5400000">
-            <a:off x="7633248" y="1683896"/>
+            <a:off x="7633250" y="1683898"/>
             <a:ext cx="81899" cy="32285"/>
           </a:xfrm>
           <a:prstGeom prst="bentConnector3">
@@ -8603,7 +8609,7 @@
         </p:nvSpPr>
         <p:spPr>
           <a:xfrm>
-            <a:off x="1097791" y="1582873"/>
+            <a:off x="1097793" y="1582873"/>
             <a:ext cx="322645" cy="260070"/>
           </a:xfrm>
           <a:prstGeom prst="rect">
@@ -8721,7 +8727,7 @@
         </p:nvSpPr>
         <p:spPr>
           <a:xfrm>
-            <a:off x="4800600" y="1394628"/>
+            <a:off x="4800602" y="1394628"/>
             <a:ext cx="761711" cy="260070"/>
           </a:xfrm>
           <a:prstGeom prst="rect">
@@ -8776,7 +8782,7 @@
         </p:nvSpPr>
         <p:spPr>
           <a:xfrm>
-            <a:off x="3126462" y="2035861"/>
+            <a:off x="3126464" y="2035863"/>
             <a:ext cx="476042" cy="260070"/>
           </a:xfrm>
           <a:prstGeom prst="rect">
@@ -8824,7 +8830,7 @@
         </p:nvSpPr>
         <p:spPr>
           <a:xfrm>
-            <a:off x="6007946" y="2807616"/>
+            <a:off x="6007950" y="2807616"/>
             <a:ext cx="854117" cy="260070"/>
           </a:xfrm>
           <a:prstGeom prst="rect">
@@ -8875,7 +8881,7 @@
         </p:nvSpPr>
         <p:spPr>
           <a:xfrm>
-            <a:off x="7316076" y="2354309"/>
+            <a:off x="7316076" y="2354311"/>
             <a:ext cx="696972" cy="260070"/>
           </a:xfrm>
           <a:prstGeom prst="rect">
@@ -8934,7 +8940,7 @@
         </p:nvSpPr>
         <p:spPr>
           <a:xfrm>
-            <a:off x="7190168" y="3604423"/>
+            <a:off x="7190168" y="3604425"/>
             <a:ext cx="696972" cy="260070"/>
           </a:xfrm>
           <a:prstGeom prst="rect">
@@ -8978,7 +8984,7 @@
         </p:nvSpPr>
         <p:spPr>
           <a:xfrm>
-            <a:off x="7190168" y="3949065"/>
+            <a:off x="7190168" y="3949067"/>
             <a:ext cx="696972" cy="260070"/>
           </a:xfrm>
           <a:prstGeom prst="rect">
@@ -9066,7 +9072,7 @@
         </p:nvSpPr>
         <p:spPr>
           <a:xfrm>
-            <a:off x="2115504" y="4201784"/>
+            <a:off x="2115508" y="4201784"/>
             <a:ext cx="638001" cy="260070"/>
           </a:xfrm>
           <a:prstGeom prst="rect">
@@ -9127,7 +9133,7 @@
         </p:nvCxnSpPr>
         <p:spPr>
           <a:xfrm rot="10800000" flipV="1">
-            <a:off x="1398527" y="1643367"/>
+            <a:off x="1398529" y="1643367"/>
             <a:ext cx="207517" cy="2453"/>
           </a:xfrm>
           <a:prstGeom prst="bentConnector3">
@@ -9170,7 +9176,7 @@
         </p:nvCxnSpPr>
         <p:spPr>
           <a:xfrm>
-            <a:off x="2902489" y="2165144"/>
+            <a:off x="2902493" y="2165144"/>
             <a:ext cx="223973" cy="752"/>
           </a:xfrm>
           <a:prstGeom prst="bentConnector3">
@@ -9256,7 +9262,7 @@
         </p:nvCxnSpPr>
         <p:spPr>
           <a:xfrm rot="5400000">
-            <a:off x="7670932" y="3026668"/>
+            <a:off x="7670934" y="3026668"/>
             <a:ext cx="551371" cy="118954"/>
           </a:xfrm>
           <a:prstGeom prst="bentConnector2">
@@ -9336,7 +9342,7 @@
         </p:nvSpPr>
         <p:spPr>
           <a:xfrm rot="5400000">
-            <a:off x="7917575" y="2656924"/>
+            <a:off x="7917577" y="2656926"/>
             <a:ext cx="177036" cy="130035"/>
           </a:xfrm>
           <a:prstGeom prst="flowChartDecision">
@@ -9383,7 +9389,7 @@
         </p:nvSpPr>
         <p:spPr>
           <a:xfrm>
-            <a:off x="6867038" y="2874501"/>
+            <a:off x="6867040" y="2874505"/>
             <a:ext cx="177036" cy="130035"/>
           </a:xfrm>
           <a:prstGeom prst="flowChartDecision">
@@ -9424,7 +9430,7 @@
         </p:nvSpPr>
         <p:spPr>
           <a:xfrm>
-            <a:off x="5578577" y="1458767"/>
+            <a:off x="5578579" y="1458769"/>
             <a:ext cx="177036" cy="130035"/>
           </a:xfrm>
           <a:prstGeom prst="flowChartDecision">
@@ -9467,7 +9473,7 @@
         </p:nvSpPr>
         <p:spPr>
           <a:xfrm>
-            <a:off x="6386642" y="4650130"/>
+            <a:off x="6386646" y="4650132"/>
             <a:ext cx="1056449" cy="260070"/>
           </a:xfrm>
           <a:prstGeom prst="rect">
@@ -9521,7 +9527,7 @@
         </p:nvCxnSpPr>
         <p:spPr>
           <a:xfrm>
-            <a:off x="1842391" y="3049355"/>
+            <a:off x="1842391" y="3049357"/>
             <a:ext cx="5072476" cy="1860845"/>
           </a:xfrm>
           <a:prstGeom prst="bentConnector4">
@@ -9563,7 +9569,7 @@
         </p:nvSpPr>
         <p:spPr>
           <a:xfrm rot="16200000">
-            <a:off x="7405040" y="4714344"/>
+            <a:off x="7405042" y="4714344"/>
             <a:ext cx="202878" cy="131642"/>
           </a:xfrm>
           <a:prstGeom prst="triangle">
@@ -9607,7 +9613,7 @@
         </p:nvCxnSpPr>
         <p:spPr>
           <a:xfrm flipH="1">
-            <a:off x="7572300" y="2484344"/>
+            <a:off x="7572300" y="2484346"/>
             <a:ext cx="440748" cy="2295821"/>
           </a:xfrm>
           <a:prstGeom prst="bentConnector3">
@@ -9648,7 +9654,7 @@
         </p:nvSpPr>
         <p:spPr>
           <a:xfrm>
-            <a:off x="3811770" y="1874391"/>
+            <a:off x="3811772" y="1874393"/>
             <a:ext cx="1208900" cy="333480"/>
           </a:xfrm>
           <a:prstGeom prst="rect">
@@ -9722,7 +9728,7 @@
         </p:nvSpPr>
         <p:spPr>
           <a:xfrm flipH="1">
-            <a:off x="4477347" y="2263676"/>
+            <a:off x="4477347" y="2263678"/>
             <a:ext cx="1053082" cy="260070"/>
           </a:xfrm>
           <a:prstGeom prst="rect">
@@ -9854,7 +9860,7 @@
         </p:nvSpPr>
         <p:spPr>
           <a:xfrm rot="16200000">
-            <a:off x="5001407" y="1979909"/>
+            <a:off x="5001409" y="1979909"/>
             <a:ext cx="202878" cy="131642"/>
           </a:xfrm>
           <a:prstGeom prst="triangle">
@@ -9894,7 +9900,7 @@
         </p:nvSpPr>
         <p:spPr>
           <a:xfrm flipH="1">
-            <a:off x="4478654" y="4664834"/>
+            <a:off x="4478656" y="4664836"/>
             <a:ext cx="1053082" cy="260070"/>
           </a:xfrm>
           <a:prstGeom prst="rect">
@@ -9942,7 +9948,7 @@
         </p:nvCxnSpPr>
         <p:spPr>
           <a:xfrm>
-            <a:off x="5168668" y="2045730"/>
+            <a:off x="5168668" y="2045732"/>
             <a:ext cx="363068" cy="2749139"/>
           </a:xfrm>
           <a:prstGeom prst="bentConnector3">
@@ -9979,7 +9985,7 @@
         </p:nvCxnSpPr>
         <p:spPr>
           <a:xfrm>
-            <a:off x="2912274" y="2001331"/>
+            <a:off x="2912274" y="2001335"/>
             <a:ext cx="899512" cy="9525"/>
           </a:xfrm>
           <a:prstGeom prst="bentConnector3">
@@ -10023,7 +10029,7 @@
         </p:nvCxnSpPr>
         <p:spPr>
           <a:xfrm rot="5400000" flipH="1" flipV="1">
-            <a:off x="4495745" y="1566885"/>
+            <a:off x="4495745" y="1566887"/>
             <a:ext cx="347077" cy="262634"/>
           </a:xfrm>
           <a:prstGeom prst="bentConnector2">
@@ -10109,7 +10115,7 @@
         </p:nvCxnSpPr>
         <p:spPr>
           <a:xfrm rot="16200000" flipV="1">
-            <a:off x="3961637" y="1419809"/>
+            <a:off x="3961639" y="1419809"/>
             <a:ext cx="347076" cy="562090"/>
           </a:xfrm>
           <a:prstGeom prst="bentConnector2">
@@ -10150,7 +10156,7 @@
         </p:nvCxnSpPr>
         <p:spPr>
           <a:xfrm flipV="1">
-            <a:off x="1051560" y="1527315"/>
+            <a:off x="1051562" y="1527315"/>
             <a:ext cx="1749488" cy="1322534"/>
           </a:xfrm>
           <a:prstGeom prst="bentConnector3">
@@ -10191,7 +10197,7 @@
         </p:nvSpPr>
         <p:spPr>
           <a:xfrm>
-            <a:off x="7190168" y="3231795"/>
+            <a:off x="7190168" y="3231797"/>
             <a:ext cx="696972" cy="260070"/>
           </a:xfrm>
           <a:prstGeom prst="rect">
@@ -10235,7 +10241,7 @@
         </p:nvSpPr>
         <p:spPr>
           <a:xfrm>
-            <a:off x="6001278" y="1874391"/>
+            <a:off x="6001282" y="1874393"/>
             <a:ext cx="854117" cy="260070"/>
           </a:xfrm>
           <a:prstGeom prst="rect">
@@ -10279,7 +10285,7 @@
         </p:nvSpPr>
         <p:spPr>
           <a:xfrm>
-            <a:off x="2082800" y="3797490"/>
+            <a:off x="2082802" y="3797490"/>
             <a:ext cx="696972" cy="260070"/>
           </a:xfrm>
           <a:prstGeom prst="rect">
@@ -10331,7 +10337,7 @@
         </p:nvCxnSpPr>
         <p:spPr>
           <a:xfrm rot="16200000" flipV="1">
-            <a:off x="2360784" y="4128062"/>
+            <a:off x="2360784" y="4128064"/>
             <a:ext cx="144224" cy="3219"/>
           </a:xfrm>
           <a:prstGeom prst="bentConnector3">
@@ -10372,8 +10378,8 @@
         </p:nvSpPr>
         <p:spPr>
           <a:xfrm>
-            <a:off x="994410" y="2849849"/>
-            <a:ext cx="1309640" cy="260070"/>
+            <a:off x="994411" y="2849851"/>
+            <a:ext cx="1309641" cy="260070"/>
           </a:xfrm>
           <a:prstGeom prst="rect">
             <a:avLst/>
@@ -10431,7 +10437,7 @@
         </p:nvSpPr>
         <p:spPr>
           <a:xfrm>
-            <a:off x="2272874" y="1939319"/>
+            <a:off x="2272874" y="1939323"/>
             <a:ext cx="592644" cy="331959"/>
           </a:xfrm>
           <a:prstGeom prst="rect">
@@ -10492,7 +10498,7 @@
         </p:nvCxnSpPr>
         <p:spPr>
           <a:xfrm>
-            <a:off x="2569197" y="2259848"/>
+            <a:off x="2569197" y="2259852"/>
             <a:ext cx="1550" cy="122433"/>
           </a:xfrm>
           <a:prstGeom prst="straightConnector1">
@@ -10531,7 +10537,7 @@
         </p:nvSpPr>
         <p:spPr>
           <a:xfrm>
-            <a:off x="1166887" y="2415636"/>
+            <a:off x="1166887" y="2415638"/>
             <a:ext cx="603390" cy="260070"/>
           </a:xfrm>
           <a:prstGeom prst="rect">
@@ -10619,7 +10625,7 @@
         </p:nvSpPr>
         <p:spPr>
           <a:xfrm>
-            <a:off x="1238594" y="2032486"/>
+            <a:off x="1238595" y="2032486"/>
             <a:ext cx="803447" cy="260070"/>
           </a:xfrm>
           <a:prstGeom prst="rect">
@@ -10670,7 +10676,7 @@
         </p:nvSpPr>
         <p:spPr>
           <a:xfrm flipV="1">
-            <a:off x="1411043" y="1896868"/>
+            <a:off x="1411045" y="1896868"/>
             <a:ext cx="202878" cy="131642"/>
           </a:xfrm>
           <a:prstGeom prst="triangle">
@@ -10714,7 +10720,7 @@
         </p:nvCxnSpPr>
         <p:spPr>
           <a:xfrm rot="10800000" flipV="1">
-            <a:off x="1512482" y="1710455"/>
+            <a:off x="1512484" y="1710457"/>
             <a:ext cx="93561" cy="186412"/>
           </a:xfrm>
           <a:prstGeom prst="bentConnector2">
@@ -10756,7 +10762,7 @@
         </p:nvCxnSpPr>
         <p:spPr>
           <a:xfrm>
-            <a:off x="2004521" y="1690578"/>
+            <a:off x="2004523" y="1690580"/>
             <a:ext cx="564676" cy="248741"/>
           </a:xfrm>
           <a:prstGeom prst="bentConnector2">
@@ -10801,7 +10807,7 @@
         </p:nvSpPr>
         <p:spPr>
           <a:xfrm>
-            <a:off x="7190168" y="2846188"/>
+            <a:off x="7190168" y="2846190"/>
             <a:ext cx="696972" cy="260070"/>
           </a:xfrm>
           <a:prstGeom prst="rect">
@@ -10852,7 +10858,7 @@
         <p:spPr>
           <a:xfrm>
             <a:off x="7861300" y="2743200"/>
-            <a:ext cx="66174" cy="300082"/>
+            <a:ext cx="66174" cy="304899"/>
           </a:xfrm>
           <a:prstGeom prst="rect">
             <a:avLst/>
@@ -10890,7 +10896,7 @@
         </p:nvSpPr>
         <p:spPr>
           <a:xfrm>
-            <a:off x="7314330" y="1880821"/>
+            <a:off x="7314332" y="1880821"/>
             <a:ext cx="696972" cy="260070"/>
           </a:xfrm>
           <a:prstGeom prst="rect">
@@ -10961,7 +10967,7 @@
         </p:nvCxnSpPr>
         <p:spPr>
           <a:xfrm rot="16200000" flipH="1">
-            <a:off x="7556981" y="2246726"/>
+            <a:off x="7556981" y="2246725"/>
             <a:ext cx="213418" cy="1746"/>
           </a:xfrm>
           <a:prstGeom prst="bentConnector3">
@@ -11055,7 +11061,7 @@
         </p:nvSpPr>
         <p:spPr>
           <a:xfrm>
-            <a:off x="6016483" y="1381874"/>
+            <a:off x="6016485" y="1381876"/>
             <a:ext cx="854117" cy="283880"/>
           </a:xfrm>
           <a:prstGeom prst="rect">
@@ -11105,7 +11111,7 @@
         </p:nvSpPr>
         <p:spPr>
           <a:xfrm>
-            <a:off x="6890143" y="1380101"/>
+            <a:off x="6890145" y="1380103"/>
             <a:ext cx="177036" cy="130035"/>
           </a:xfrm>
           <a:prstGeom prst="flowChartDecision">
@@ -11155,7 +11161,7 @@
         </p:nvCxnSpPr>
         <p:spPr>
           <a:xfrm flipV="1">
-            <a:off x="7067179" y="1444096"/>
+            <a:off x="7067181" y="1444096"/>
             <a:ext cx="242389" cy="1022"/>
           </a:xfrm>
           <a:prstGeom prst="bentConnector3">
@@ -11198,7 +11204,7 @@
         </p:nvSpPr>
         <p:spPr>
           <a:xfrm>
-            <a:off x="7309567" y="1399019"/>
+            <a:off x="7309569" y="1399019"/>
             <a:ext cx="761543" cy="260070"/>
           </a:xfrm>
           <a:prstGeom prst="rect">
@@ -11312,8 +11318,8 @@
         </p:nvSpPr>
         <p:spPr>
           <a:xfrm>
-            <a:off x="7865993" y="3124200"/>
-            <a:ext cx="66174" cy="300082"/>
+            <a:off x="7865993" y="3124201"/>
+            <a:ext cx="66174" cy="304899"/>
           </a:xfrm>
           <a:prstGeom prst="rect">
             <a:avLst/>
@@ -11464,7 +11470,7 @@
         </p:nvSpPr>
         <p:spPr>
           <a:xfrm>
-            <a:off x="1235449" y="3759200"/>
+            <a:off x="1235451" y="3759202"/>
             <a:ext cx="644651" cy="296903"/>
           </a:xfrm>
           <a:prstGeom prst="rect">
@@ -11532,7 +11538,7 @@
         </p:nvCxnSpPr>
         <p:spPr>
           <a:xfrm rot="5400000" flipH="1" flipV="1">
-            <a:off x="1809698" y="2416947"/>
+            <a:off x="1809698" y="2416952"/>
             <a:ext cx="774824" cy="151529"/>
           </a:xfrm>
           <a:prstGeom prst="bentConnector2">
@@ -11579,7 +11585,7 @@
         </p:nvCxnSpPr>
         <p:spPr>
           <a:xfrm>
-            <a:off x="1840094" y="4438863"/>
+            <a:off x="1840098" y="4438867"/>
             <a:ext cx="594411" cy="22991"/>
           </a:xfrm>
           <a:prstGeom prst="bentConnector4">
@@ -11626,7 +11632,7 @@
         </p:nvSpPr>
         <p:spPr>
           <a:xfrm>
-            <a:off x="2791905" y="4201784"/>
+            <a:off x="2791908" y="4201784"/>
             <a:ext cx="592645" cy="260070"/>
           </a:xfrm>
           <a:prstGeom prst="rect">
@@ -11691,7 +11697,7 @@
         </p:nvSpPr>
         <p:spPr>
           <a:xfrm>
-            <a:off x="2552154" y="2378585"/>
+            <a:off x="2552154" y="2378587"/>
             <a:ext cx="799168" cy="247958"/>
           </a:xfrm>
           <a:prstGeom prst="rect">
@@ -11759,7 +11765,7 @@
         </p:nvCxnSpPr>
         <p:spPr>
           <a:xfrm rot="5400000">
-            <a:off x="1231596" y="3155188"/>
+            <a:off x="1231596" y="3155190"/>
             <a:ext cx="2060540" cy="292723"/>
           </a:xfrm>
           <a:prstGeom prst="bentConnector4">
@@ -11967,7 +11973,7 @@
         </p:nvSpPr>
         <p:spPr>
           <a:xfrm>
-            <a:off x="1235630" y="3340516"/>
+            <a:off x="1235632" y="3340518"/>
             <a:ext cx="644651" cy="296903"/>
           </a:xfrm>
           <a:prstGeom prst="rect">
@@ -12036,7 +12042,7 @@
         </p:nvCxnSpPr>
         <p:spPr>
           <a:xfrm flipH="1">
-            <a:off x="1557775" y="3637419"/>
+            <a:off x="1557775" y="3637421"/>
             <a:ext cx="181" cy="121781"/>
           </a:xfrm>
           <a:prstGeom prst="straightConnector1">
@@ -12083,7 +12089,7 @@
         </p:nvCxnSpPr>
         <p:spPr>
           <a:xfrm flipV="1">
-            <a:off x="1880281" y="2275254"/>
+            <a:off x="1880281" y="2275256"/>
             <a:ext cx="472826" cy="1213713"/>
           </a:xfrm>
           <a:prstGeom prst="bentConnector2">
@@ -12129,7 +12135,7 @@
         </p:nvCxnSpPr>
         <p:spPr>
           <a:xfrm rot="5400000">
-            <a:off x="624566" y="2356410"/>
+            <a:off x="624568" y="2356410"/>
             <a:ext cx="1009219" cy="2"/>
           </a:xfrm>
           <a:prstGeom prst="bentConnector3">
@@ -12178,7 +12184,7 @@
         </p:nvCxnSpPr>
         <p:spPr>
           <a:xfrm rot="16200000" flipH="1">
-            <a:off x="1453096" y="3235657"/>
+            <a:off x="1453098" y="3235659"/>
             <a:ext cx="209537" cy="182"/>
           </a:xfrm>
           <a:prstGeom prst="bentConnector3">
@@ -12228,7 +12234,7 @@
         </p:nvCxnSpPr>
         <p:spPr>
           <a:xfrm rot="5400000">
-            <a:off x="7484617" y="3212982"/>
+            <a:off x="7484619" y="3212984"/>
             <a:ext cx="923999" cy="118954"/>
           </a:xfrm>
           <a:prstGeom prst="bentConnector2">
@@ -12270,14 +12276,14 @@
           <p:cNvCxnSpPr>
             <a:cxnSpLocks/>
             <a:stCxn id="90" idx="3"/>
-            <a:endCxn id="21" idx="3"/>
+            <a:endCxn id="22" idx="3"/>
           </p:cNvCxnSpPr>
           <p:nvPr/>
         </p:nvCxnSpPr>
         <p:spPr>
           <a:xfrm rot="5400000">
-            <a:off x="7312297" y="3385303"/>
-            <a:ext cx="1268641" cy="118954"/>
+            <a:off x="7140849" y="3556754"/>
+            <a:ext cx="1611538" cy="118955"/>
           </a:xfrm>
           <a:prstGeom prst="bentConnector2">
             <a:avLst/>
@@ -12318,14 +12324,14 @@
           <p:cNvCxnSpPr>
             <a:cxnSpLocks/>
             <a:stCxn id="90" idx="3"/>
-            <a:endCxn id="22" idx="3"/>
+            <a:endCxn id="21" idx="3"/>
           </p:cNvCxnSpPr>
           <p:nvPr/>
         </p:nvCxnSpPr>
         <p:spPr>
           <a:xfrm rot="5400000">
-            <a:off x="7140847" y="3556753"/>
-            <a:ext cx="1611541" cy="118954"/>
+            <a:off x="7312298" y="3385305"/>
+            <a:ext cx="1268640" cy="118955"/>
           </a:xfrm>
           <a:prstGeom prst="bentConnector2">
             <a:avLst/>
@@ -12418,7 +12424,7 @@
         </p:nvCxnSpPr>
         <p:spPr>
           <a:xfrm rot="10800000" flipV="1">
-            <a:off x="1420439" y="1920970"/>
+            <a:off x="1420441" y="1920972"/>
             <a:ext cx="3541703" cy="2954750"/>
           </a:xfrm>
           <a:prstGeom prst="bentConnector4">
@@ -12466,7 +12472,7 @@
         </p:nvSpPr>
         <p:spPr>
           <a:xfrm flipH="1">
-            <a:off x="4481817" y="3156600"/>
+            <a:off x="4481819" y="3156602"/>
             <a:ext cx="1053082" cy="260070"/>
           </a:xfrm>
           <a:prstGeom prst="rect">
@@ -12528,7 +12534,7 @@
         </p:nvSpPr>
         <p:spPr>
           <a:xfrm flipH="1">
-            <a:off x="4481817" y="3452840"/>
+            <a:off x="4481819" y="3452840"/>
             <a:ext cx="1053082" cy="260070"/>
           </a:xfrm>
           <a:prstGeom prst="rect">
@@ -12578,7 +12584,7 @@
         </p:nvSpPr>
         <p:spPr>
           <a:xfrm flipH="1">
-            <a:off x="4481817" y="3749081"/>
+            <a:off x="4481819" y="3749081"/>
             <a:ext cx="1053082" cy="260070"/>
           </a:xfrm>
           <a:prstGeom prst="rect">
@@ -12681,7 +12687,7 @@
         </p:nvSpPr>
         <p:spPr>
           <a:xfrm flipH="1">
-            <a:off x="4474716" y="4365566"/>
+            <a:off x="4474718" y="4365568"/>
             <a:ext cx="1053082" cy="260070"/>
           </a:xfrm>
           <a:prstGeom prst="rect">
@@ -12731,7 +12737,7 @@
         </p:nvSpPr>
         <p:spPr>
           <a:xfrm>
-            <a:off x="3249262" y="3489843"/>
+            <a:off x="3249264" y="3489845"/>
             <a:ext cx="476042" cy="260070"/>
           </a:xfrm>
           <a:prstGeom prst="rect">
@@ -12790,7 +12796,7 @@
         </p:nvSpPr>
         <p:spPr>
           <a:xfrm>
-            <a:off x="2522485" y="3025066"/>
+            <a:off x="2522485" y="3025068"/>
             <a:ext cx="660908" cy="260070"/>
           </a:xfrm>
           <a:prstGeom prst="rect">
@@ -12849,7 +12855,7 @@
         </p:nvSpPr>
         <p:spPr>
           <a:xfrm>
-            <a:off x="3507555" y="2373553"/>
+            <a:off x="3507557" y="2373555"/>
             <a:ext cx="738508" cy="260070"/>
           </a:xfrm>
           <a:prstGeom prst="rect">
@@ -12911,7 +12917,7 @@
         </p:nvCxnSpPr>
         <p:spPr>
           <a:xfrm rot="16200000" flipV="1">
-            <a:off x="2607401" y="2779528"/>
+            <a:off x="2607403" y="2779530"/>
             <a:ext cx="391643" cy="99434"/>
           </a:xfrm>
           <a:prstGeom prst="bentConnector3">
@@ -12962,7 +12968,7 @@
         </p:nvCxnSpPr>
         <p:spPr>
           <a:xfrm rot="10800000">
-            <a:off x="4246064" y="2426437"/>
+            <a:off x="4246066" y="2426441"/>
             <a:ext cx="235754" cy="783047"/>
           </a:xfrm>
           <a:prstGeom prst="bentConnector3">
@@ -13012,7 +13018,7 @@
         </p:nvCxnSpPr>
         <p:spPr>
           <a:xfrm rot="10800000">
-            <a:off x="3487284" y="3749913"/>
+            <a:off x="3487284" y="3749915"/>
             <a:ext cx="994534" cy="129203"/>
           </a:xfrm>
           <a:prstGeom prst="bentConnector2">
@@ -13056,7 +13062,7 @@
         </p:nvSpPr>
         <p:spPr>
           <a:xfrm>
-            <a:off x="6006081" y="2340188"/>
+            <a:off x="6006085" y="2340190"/>
             <a:ext cx="854117" cy="260070"/>
           </a:xfrm>
           <a:prstGeom prst="rect">
@@ -13125,7 +13131,7 @@
         </p:nvCxnSpPr>
         <p:spPr>
           <a:xfrm rot="10800000">
-            <a:off x="3487283" y="3749913"/>
+            <a:off x="3487287" y="3749913"/>
             <a:ext cx="987279" cy="446268"/>
           </a:xfrm>
           <a:prstGeom prst="bentConnector2">
@@ -13221,7 +13227,7 @@
         </p:nvCxnSpPr>
         <p:spPr>
           <a:xfrm rot="10800000">
-            <a:off x="3351323" y="2502565"/>
+            <a:off x="3351327" y="2502565"/>
             <a:ext cx="156233" cy="1024"/>
           </a:xfrm>
           <a:prstGeom prst="bentConnector3">
@@ -13274,7 +13280,7 @@
         </p:nvCxnSpPr>
         <p:spPr>
           <a:xfrm rot="10800000">
-            <a:off x="2947517" y="3590428"/>
+            <a:off x="2947519" y="3590432"/>
             <a:ext cx="115003" cy="1735"/>
           </a:xfrm>
           <a:prstGeom prst="bentConnector3">
@@ -13325,7 +13331,7 @@
         </p:nvCxnSpPr>
         <p:spPr>
           <a:xfrm rot="10800000" flipV="1">
-            <a:off x="1721719" y="3726180"/>
+            <a:off x="1721723" y="3726180"/>
             <a:ext cx="1681565" cy="1001088"/>
           </a:xfrm>
           <a:prstGeom prst="bentConnector3">
@@ -13374,7 +13380,7 @@
         </p:nvSpPr>
         <p:spPr>
           <a:xfrm>
-            <a:off x="2895600" y="2750522"/>
+            <a:off x="2895600" y="2750524"/>
             <a:ext cx="799168" cy="247958"/>
           </a:xfrm>
           <a:prstGeom prst="rect">
@@ -13441,7 +13447,7 @@
         </p:nvCxnSpPr>
         <p:spPr>
           <a:xfrm rot="5400000">
-            <a:off x="3539440" y="2663159"/>
+            <a:off x="3539440" y="2663163"/>
             <a:ext cx="164834" cy="1"/>
           </a:xfrm>
           <a:prstGeom prst="bentConnector3">
@@ -13490,7 +13496,7 @@
         </p:nvSpPr>
         <p:spPr>
           <a:xfrm>
-            <a:off x="3693640" y="3161255"/>
+            <a:off x="3693642" y="3161255"/>
             <a:ext cx="476042" cy="260070"/>
           </a:xfrm>
           <a:prstGeom prst="rect">
@@ -13551,7 +13557,7 @@
         </p:nvCxnSpPr>
         <p:spPr>
           <a:xfrm rot="10800000">
-            <a:off x="4246064" y="2426435"/>
+            <a:off x="4246066" y="2426435"/>
             <a:ext cx="235754" cy="1079288"/>
           </a:xfrm>
           <a:prstGeom prst="bentConnector3">
@@ -13599,7 +13605,7 @@
         </p:nvCxnSpPr>
         <p:spPr>
           <a:xfrm rot="16200000" flipH="1">
-            <a:off x="3556236" y="2890922"/>
+            <a:off x="3556238" y="2890924"/>
             <a:ext cx="538067" cy="2598"/>
           </a:xfrm>
           <a:prstGeom prst="bentConnector3">
@@ -13697,7 +13703,7 @@
         </p:nvSpPr>
         <p:spPr>
           <a:xfrm>
-            <a:off x="3730753" y="3545034"/>
+            <a:off x="3730755" y="3545038"/>
             <a:ext cx="177036" cy="130035"/>
           </a:xfrm>
           <a:prstGeom prst="flowChartDecision">
@@ -13756,7 +13762,7 @@
         </p:nvCxnSpPr>
         <p:spPr>
           <a:xfrm rot="5400000" flipH="1" flipV="1">
-            <a:off x="3742821" y="3491445"/>
+            <a:off x="3742821" y="3491449"/>
             <a:ext cx="152900" cy="1"/>
           </a:xfrm>
           <a:prstGeom prst="bentConnector3">
@@ -13863,7 +13869,7 @@
         </p:nvSpPr>
         <p:spPr>
           <a:xfrm>
-            <a:off x="3062519" y="3527144"/>
+            <a:off x="3062521" y="3527148"/>
             <a:ext cx="177036" cy="130035"/>
           </a:xfrm>
           <a:prstGeom prst="flowChartDecision">
@@ -13922,7 +13928,7 @@
         </p:nvCxnSpPr>
         <p:spPr>
           <a:xfrm rot="16200000" flipV="1">
-            <a:off x="3167968" y="3215827"/>
+            <a:off x="3167968" y="3215829"/>
             <a:ext cx="334742" cy="303890"/>
           </a:xfrm>
           <a:prstGeom prst="bentConnector2">
@@ -13971,7 +13977,7 @@
         </p:nvCxnSpPr>
         <p:spPr>
           <a:xfrm rot="5400000">
-            <a:off x="2621868" y="3372764"/>
+            <a:off x="2621868" y="3372768"/>
             <a:ext cx="175256" cy="1"/>
           </a:xfrm>
           <a:prstGeom prst="bentConnector3">
@@ -14023,7 +14029,7 @@
         </p:nvCxnSpPr>
         <p:spPr>
           <a:xfrm flipV="1">
-            <a:off x="7044073" y="2484344"/>
+            <a:off x="7044075" y="2484348"/>
             <a:ext cx="272003" cy="455175"/>
           </a:xfrm>
           <a:prstGeom prst="bentConnector3">
@@ -14066,7 +14072,7 @@
         </p:nvSpPr>
         <p:spPr>
           <a:xfrm>
-            <a:off x="6867038" y="2313568"/>
+            <a:off x="6867040" y="2313572"/>
             <a:ext cx="177036" cy="130035"/>
           </a:xfrm>
           <a:prstGeom prst="flowChartDecision">
@@ -14597,7 +14603,7 @@
         </p:nvCxnSpPr>
         <p:spPr>
           <a:xfrm rot="21420000" flipV="1">
-            <a:off x="6433139" y="4426653"/>
+            <a:off x="6433141" y="4426653"/>
             <a:ext cx="8793" cy="152164"/>
           </a:xfrm>
           <a:prstGeom prst="straightConnector1">
@@ -14697,7 +14703,7 @@
         </p:nvCxnSpPr>
         <p:spPr>
           <a:xfrm flipV="1">
-            <a:off x="7044074" y="1529054"/>
+            <a:off x="7044076" y="1529054"/>
             <a:ext cx="265493" cy="849532"/>
           </a:xfrm>
           <a:prstGeom prst="bentConnector3">
@@ -14793,7 +14799,7 @@
         </p:nvSpPr>
         <p:spPr>
           <a:xfrm>
-            <a:off x="6123688" y="3680999"/>
+            <a:off x="6123688" y="3681001"/>
             <a:ext cx="696972" cy="260070"/>
           </a:xfrm>
           <a:prstGeom prst="rect">
@@ -15066,7 +15072,7 @@
         </p:nvCxnSpPr>
         <p:spPr>
           <a:xfrm rot="5400000" flipH="1" flipV="1">
-            <a:off x="3902841" y="3071392"/>
+            <a:off x="3902841" y="3071396"/>
             <a:ext cx="152900" cy="1"/>
           </a:xfrm>
           <a:prstGeom prst="bentConnector3">
@@ -15118,7 +15124,7 @@
         </p:nvCxnSpPr>
         <p:spPr>
           <a:xfrm>
-            <a:off x="5168667" y="2045730"/>
+            <a:off x="5168671" y="2045732"/>
             <a:ext cx="359131" cy="2449871"/>
           </a:xfrm>
           <a:prstGeom prst="bentConnector3">
@@ -15163,7 +15169,7 @@
         </p:nvCxnSpPr>
         <p:spPr>
           <a:xfrm>
-            <a:off x="5168667" y="2045730"/>
+            <a:off x="5168667" y="2045734"/>
             <a:ext cx="358978" cy="2150451"/>
           </a:xfrm>
           <a:prstGeom prst="bentConnector3">
@@ -15208,7 +15214,7 @@
         </p:nvCxnSpPr>
         <p:spPr>
           <a:xfrm>
-            <a:off x="5168667" y="2045730"/>
+            <a:off x="5168667" y="2045732"/>
             <a:ext cx="366232" cy="1833386"/>
           </a:xfrm>
           <a:prstGeom prst="bentConnector3">
@@ -15253,7 +15259,7 @@
         </p:nvCxnSpPr>
         <p:spPr>
           <a:xfrm>
-            <a:off x="5168667" y="2045730"/>
+            <a:off x="5168667" y="2045732"/>
             <a:ext cx="366232" cy="1537145"/>
           </a:xfrm>
           <a:prstGeom prst="bentConnector3">
@@ -15298,7 +15304,7 @@
         </p:nvCxnSpPr>
         <p:spPr>
           <a:xfrm>
-            <a:off x="5168667" y="2045730"/>
+            <a:off x="5168667" y="2045732"/>
             <a:ext cx="366232" cy="1240905"/>
           </a:xfrm>
           <a:prstGeom prst="bentConnector3">
@@ -15343,7 +15349,7 @@
         </p:nvCxnSpPr>
         <p:spPr>
           <a:xfrm>
-            <a:off x="5168667" y="2045730"/>
+            <a:off x="5168667" y="2045734"/>
             <a:ext cx="361762" cy="940461"/>
           </a:xfrm>
           <a:prstGeom prst="bentConnector3">
@@ -15388,7 +15394,7 @@
         </p:nvCxnSpPr>
         <p:spPr>
           <a:xfrm>
-            <a:off x="5168667" y="2045730"/>
+            <a:off x="5168667" y="2045734"/>
             <a:ext cx="361762" cy="644221"/>
           </a:xfrm>
           <a:prstGeom prst="bentConnector3">
@@ -15433,7 +15439,7 @@
         </p:nvCxnSpPr>
         <p:spPr>
           <a:xfrm>
-            <a:off x="5168667" y="2045730"/>
+            <a:off x="5168667" y="2045734"/>
             <a:ext cx="361762" cy="347981"/>
           </a:xfrm>
           <a:prstGeom prst="bentConnector3">
@@ -15611,7 +15617,7 @@
         </p:nvCxnSpPr>
         <p:spPr>
           <a:xfrm rot="16200000" flipH="1">
-            <a:off x="5136573" y="4086558"/>
+            <a:off x="5136577" y="4086558"/>
             <a:ext cx="614343" cy="1840116"/>
           </a:xfrm>
           <a:prstGeom prst="bentConnector2">
@@ -15650,7 +15656,7 @@
         </p:nvSpPr>
         <p:spPr>
           <a:xfrm rot="10800000">
-            <a:off x="6964221" y="4953000"/>
+            <a:off x="6964221" y="4953002"/>
             <a:ext cx="270504" cy="175523"/>
           </a:xfrm>
           <a:prstGeom prst="triangle">
@@ -15693,7 +15699,7 @@
         </p:nvCxnSpPr>
         <p:spPr>
           <a:xfrm rot="5400000">
-            <a:off x="6974138" y="4824781"/>
+            <a:off x="6974142" y="4824785"/>
             <a:ext cx="253555" cy="2883"/>
           </a:xfrm>
           <a:prstGeom prst="bentConnector3">
@@ -15734,7 +15740,7 @@
         </p:nvSpPr>
         <p:spPr>
           <a:xfrm>
-            <a:off x="3650593" y="4352685"/>
+            <a:off x="3650595" y="4352685"/>
             <a:ext cx="1746186" cy="346760"/>
           </a:xfrm>
           <a:prstGeom prst="rect">
@@ -15823,7 +15829,7 @@
         </p:nvSpPr>
         <p:spPr>
           <a:xfrm>
-            <a:off x="1804246" y="4363150"/>
+            <a:off x="1804250" y="4363150"/>
             <a:ext cx="790193" cy="346760"/>
           </a:xfrm>
           <a:prstGeom prst="rect">
@@ -15885,7 +15891,7 @@
         </p:nvCxnSpPr>
         <p:spPr>
           <a:xfrm rot="16200000" flipH="1">
-            <a:off x="2040855" y="4204661"/>
+            <a:off x="2040859" y="4204665"/>
             <a:ext cx="316975" cy="1"/>
           </a:xfrm>
           <a:prstGeom prst="bentConnector3">
@@ -16038,7 +16044,7 @@
         </p:nvCxnSpPr>
         <p:spPr>
           <a:xfrm flipV="1">
-            <a:off x="1094012" y="3824869"/>
+            <a:off x="1094014" y="3824871"/>
             <a:ext cx="710234" cy="6349"/>
           </a:xfrm>
           <a:prstGeom prst="bentConnector3">
@@ -16082,7 +16088,7 @@
         </p:nvCxnSpPr>
         <p:spPr>
           <a:xfrm rot="16200000" flipH="1">
-            <a:off x="1009578" y="3741862"/>
+            <a:off x="1009579" y="3741862"/>
             <a:ext cx="484006" cy="1105330"/>
           </a:xfrm>
           <a:prstGeom prst="bentConnector2">
@@ -16121,7 +16127,7 @@
         </p:nvSpPr>
         <p:spPr>
           <a:xfrm>
-            <a:off x="5220211" y="4341874"/>
+            <a:off x="5220215" y="4341874"/>
             <a:ext cx="790193" cy="346760"/>
           </a:xfrm>
           <a:prstGeom prst="rect">
@@ -16198,7 +16204,7 @@
         </p:nvCxnSpPr>
         <p:spPr>
           <a:xfrm rot="16200000" flipH="1">
-            <a:off x="5456820" y="4183385"/>
+            <a:off x="5456824" y="4183389"/>
             <a:ext cx="316975" cy="1"/>
           </a:xfrm>
           <a:prstGeom prst="bentConnector3">
@@ -16351,7 +16357,7 @@
         </p:nvCxnSpPr>
         <p:spPr>
           <a:xfrm flipV="1">
-            <a:off x="4334003" y="3803593"/>
+            <a:off x="4334003" y="3803597"/>
             <a:ext cx="886208" cy="6349"/>
           </a:xfrm>
           <a:prstGeom prst="bentConnector3">
@@ -16395,7 +16401,7 @@
         </p:nvCxnSpPr>
         <p:spPr>
           <a:xfrm rot="16200000" flipH="1">
-            <a:off x="3502918" y="4467237"/>
+            <a:off x="3502922" y="4467237"/>
             <a:ext cx="1162683" cy="290704"/>
           </a:xfrm>
           <a:prstGeom prst="bentConnector2">
@@ -16434,7 +16440,7 @@
         </p:nvSpPr>
         <p:spPr>
           <a:xfrm>
-            <a:off x="4229611" y="5020551"/>
+            <a:off x="4229615" y="5020551"/>
             <a:ext cx="865573" cy="346760"/>
           </a:xfrm>
           <a:prstGeom prst="rect">
@@ -16491,7 +16497,7 @@
         </p:nvSpPr>
         <p:spPr>
           <a:xfrm>
-            <a:off x="5153247" y="5020551"/>
+            <a:off x="5153251" y="5020551"/>
             <a:ext cx="865573" cy="346760"/>
           </a:xfrm>
           <a:prstGeom prst="rect">
@@ -16550,7 +16556,7 @@
         </p:nvSpPr>
         <p:spPr>
           <a:xfrm rot="10800000" flipV="1">
-            <a:off x="5453083" y="4688634"/>
+            <a:off x="5453083" y="4688638"/>
             <a:ext cx="270504" cy="175523"/>
           </a:xfrm>
           <a:prstGeom prst="triangle">
@@ -16597,7 +16603,7 @@
         </p:nvCxnSpPr>
         <p:spPr>
           <a:xfrm rot="5400000">
-            <a:off x="5047170" y="4479386"/>
+            <a:off x="5047170" y="4479388"/>
             <a:ext cx="156394" cy="925937"/>
           </a:xfrm>
           <a:prstGeom prst="bentConnector3">
@@ -16641,7 +16647,7 @@
         </p:nvCxnSpPr>
         <p:spPr>
           <a:xfrm rot="5400000">
-            <a:off x="5508988" y="4941204"/>
+            <a:off x="5508990" y="4941208"/>
             <a:ext cx="156394" cy="2301"/>
           </a:xfrm>
           <a:prstGeom prst="bentConnector3">
@@ -16682,7 +16688,7 @@
         </p:nvSpPr>
         <p:spPr>
           <a:xfrm>
-            <a:off x="2894620" y="4024899"/>
+            <a:off x="2894620" y="4024903"/>
             <a:ext cx="304800" cy="269627"/>
           </a:xfrm>
           <a:prstGeom prst="stripedRightArrow">
@@ -16718,7 +16724,7 @@
           <a:lstStyle/>
           <a:p>
             <a:pPr algn="ctr"/>
-            <a:endParaRPr lang="en-SG"/>
+            <a:endParaRPr lang="en-SG" sz="1781"/>
           </a:p>
         </p:txBody>
       </p:sp>
@@ -16730,7 +16736,7 @@
         </p:nvSpPr>
         <p:spPr>
           <a:xfrm>
-            <a:off x="757986" y="1325725"/>
+            <a:off x="757988" y="1325725"/>
             <a:ext cx="790193" cy="346760"/>
           </a:xfrm>
           <a:prstGeom prst="rect">
@@ -16792,7 +16798,7 @@
         </p:nvCxnSpPr>
         <p:spPr>
           <a:xfrm rot="16200000" flipH="1">
-            <a:off x="994595" y="1167236"/>
+            <a:off x="994597" y="1167238"/>
             <a:ext cx="316975" cy="1"/>
           </a:xfrm>
           <a:prstGeom prst="bentConnector3">
@@ -16891,7 +16897,7 @@
         </p:nvSpPr>
         <p:spPr>
           <a:xfrm>
-            <a:off x="2818655" y="1295371"/>
+            <a:off x="2818657" y="1295371"/>
             <a:ext cx="790193" cy="346760"/>
           </a:xfrm>
           <a:prstGeom prst="rect">
@@ -16968,7 +16974,7 @@
         </p:nvCxnSpPr>
         <p:spPr>
           <a:xfrm rot="16200000" flipH="1">
-            <a:off x="3055264" y="1136882"/>
+            <a:off x="3055266" y="1136884"/>
             <a:ext cx="316975" cy="1"/>
           </a:xfrm>
           <a:prstGeom prst="bentConnector3">
@@ -17008,7 +17014,7 @@
         </p:nvSpPr>
         <p:spPr>
           <a:xfrm>
-            <a:off x="2818655" y="535784"/>
+            <a:off x="2818655" y="535786"/>
             <a:ext cx="790192" cy="442612"/>
           </a:xfrm>
           <a:prstGeom prst="rect">
@@ -17067,7 +17073,7 @@
         </p:nvSpPr>
         <p:spPr>
           <a:xfrm>
-            <a:off x="2780965" y="1974048"/>
+            <a:off x="2780967" y="1974048"/>
             <a:ext cx="865573" cy="346760"/>
           </a:xfrm>
           <a:prstGeom prst="rect">
@@ -17126,7 +17132,7 @@
         </p:nvSpPr>
         <p:spPr>
           <a:xfrm rot="10800000" flipV="1">
-            <a:off x="3078499" y="1642131"/>
+            <a:off x="3078499" y="1642133"/>
             <a:ext cx="270504" cy="175523"/>
           </a:xfrm>
           <a:prstGeom prst="triangle">
@@ -17173,7 +17179,7 @@
         </p:nvCxnSpPr>
         <p:spPr>
           <a:xfrm rot="16200000" flipH="1">
-            <a:off x="3135554" y="1895850"/>
+            <a:off x="3135556" y="1895854"/>
             <a:ext cx="156394" cy="1"/>
           </a:xfrm>
           <a:prstGeom prst="bentConnector3">
@@ -17214,7 +17220,7 @@
         </p:nvSpPr>
         <p:spPr>
           <a:xfrm>
-            <a:off x="2046943" y="978396"/>
+            <a:off x="2046943" y="978398"/>
             <a:ext cx="304800" cy="269627"/>
           </a:xfrm>
           <a:prstGeom prst="stripedRightArrow">
@@ -17250,7 +17256,7 @@
           <a:lstStyle/>
           <a:p>
             <a:pPr algn="ctr"/>
-            <a:endParaRPr lang="en-SG"/>
+            <a:endParaRPr lang="en-SG" sz="1781"/>
           </a:p>
         </p:txBody>
       </p:sp>
@@ -17262,7 +17268,7 @@
         </p:nvSpPr>
         <p:spPr>
           <a:xfrm>
-            <a:off x="8142313" y="4319444"/>
+            <a:off x="8142316" y="4319444"/>
             <a:ext cx="790193" cy="346760"/>
           </a:xfrm>
           <a:prstGeom prst="rect">
@@ -17324,7 +17330,7 @@
         </p:nvCxnSpPr>
         <p:spPr>
           <a:xfrm rot="16200000" flipH="1">
-            <a:off x="8378922" y="4160955"/>
+            <a:off x="8378925" y="4160957"/>
             <a:ext cx="316975" cy="1"/>
           </a:xfrm>
           <a:prstGeom prst="bentConnector3">
@@ -17364,7 +17370,7 @@
         </p:nvSpPr>
         <p:spPr>
           <a:xfrm>
-            <a:off x="8142313" y="3559857"/>
+            <a:off x="8142313" y="3559859"/>
             <a:ext cx="790192" cy="442612"/>
           </a:xfrm>
           <a:prstGeom prst="rect">
@@ -17423,7 +17429,7 @@
         </p:nvSpPr>
         <p:spPr>
           <a:xfrm>
-            <a:off x="6465913" y="3566206"/>
+            <a:off x="6465913" y="3566207"/>
             <a:ext cx="790192" cy="442612"/>
           </a:xfrm>
           <a:prstGeom prst="rect">
@@ -17477,7 +17483,7 @@
         </p:nvCxnSpPr>
         <p:spPr>
           <a:xfrm flipV="1">
-            <a:off x="7256105" y="3781163"/>
+            <a:off x="7256107" y="3781167"/>
             <a:ext cx="886208" cy="6349"/>
           </a:xfrm>
           <a:prstGeom prst="bentConnector3">
@@ -17521,7 +17527,7 @@
         </p:nvCxnSpPr>
         <p:spPr>
           <a:xfrm rot="16200000" flipH="1">
-            <a:off x="6888571" y="3981256"/>
+            <a:off x="6888575" y="3981256"/>
             <a:ext cx="1162683" cy="1217806"/>
           </a:xfrm>
           <a:prstGeom prst="bentConnector2">
@@ -17560,7 +17566,7 @@
         </p:nvSpPr>
         <p:spPr>
           <a:xfrm>
-            <a:off x="8078815" y="4998121"/>
+            <a:off x="8078817" y="4998121"/>
             <a:ext cx="865573" cy="346760"/>
           </a:xfrm>
           <a:prstGeom prst="rect">
@@ -17664,7 +17670,7 @@
         </p:nvCxnSpPr>
         <p:spPr>
           <a:xfrm rot="16200000" flipH="1">
-            <a:off x="8432822" y="4919341"/>
+            <a:off x="8432822" y="4919343"/>
             <a:ext cx="156394" cy="1165"/>
           </a:xfrm>
           <a:prstGeom prst="bentConnector3">
@@ -17705,7 +17711,7 @@
         </p:nvSpPr>
         <p:spPr>
           <a:xfrm>
-            <a:off x="6325375" y="1210641"/>
+            <a:off x="6325375" y="1210643"/>
             <a:ext cx="1868998" cy="327923"/>
           </a:xfrm>
           <a:prstGeom prst="rect">
@@ -17880,7 +17886,7 @@
         </p:nvSpPr>
         <p:spPr>
           <a:xfrm rot="5400000">
-            <a:off x="6089483" y="1339999"/>
+            <a:off x="6089483" y="1340001"/>
             <a:ext cx="270504" cy="175523"/>
           </a:xfrm>
           <a:prstGeom prst="triangle">
@@ -17962,7 +17968,7 @@
         </p:nvCxnSpPr>
         <p:spPr>
           <a:xfrm rot="10800000">
-            <a:off x="5603816" y="1254381"/>
+            <a:off x="5603816" y="1254383"/>
             <a:ext cx="533159" cy="173380"/>
           </a:xfrm>
           <a:prstGeom prst="bentConnector3">
@@ -18160,7 +18166,7 @@
         </p:nvSpPr>
         <p:spPr>
           <a:xfrm>
-            <a:off x="6325375" y="1656858"/>
+            <a:off x="6325375" y="1656860"/>
             <a:ext cx="1868998" cy="271943"/>
           </a:xfrm>
           <a:prstGeom prst="rect">
@@ -18248,7 +18254,7 @@
         </p:nvSpPr>
         <p:spPr>
           <a:xfrm>
-            <a:off x="1143001" y="4094654"/>
+            <a:off x="1143003" y="4094656"/>
             <a:ext cx="5048121" cy="1612181"/>
           </a:xfrm>
           <a:prstGeom prst="rect">
@@ -18282,7 +18288,7 @@
           <a:lstStyle/>
           <a:p>
             <a:pPr algn="ctr"/>
-            <a:endParaRPr lang="en-SG">
+            <a:endParaRPr lang="en-SG" sz="1781">
               <a:solidFill>
                 <a:schemeClr val="accent4">
                   <a:lumMod val="75000"/>
@@ -18310,7 +18316,7 @@
         </p:nvCxnSpPr>
         <p:spPr>
           <a:xfrm>
-            <a:off x="1143001" y="4900745"/>
+            <a:off x="1143003" y="4900745"/>
             <a:ext cx="5048121" cy="0"/>
           </a:xfrm>
           <a:prstGeom prst="line">
@@ -18351,7 +18357,7 @@
         </p:nvSpPr>
         <p:spPr>
           <a:xfrm>
-            <a:off x="1295400" y="762000"/>
+            <a:off x="1295402" y="762002"/>
             <a:ext cx="2514600" cy="609600"/>
           </a:xfrm>
           <a:prstGeom prst="rect">
@@ -18494,7 +18500,7 @@
         </p:nvSpPr>
         <p:spPr>
           <a:xfrm rot="5400000">
-            <a:off x="568475" y="3845106"/>
+            <a:off x="568477" y="3845106"/>
             <a:ext cx="3930304" cy="266664"/>
           </a:xfrm>
           <a:prstGeom prst="rect">
@@ -18523,7 +18529,7 @@
           <a:lstStyle/>
           <a:p>
             <a:pPr algn="ctr"/>
-            <a:endParaRPr lang="en-SG" dirty="0"/>
+            <a:endParaRPr lang="en-SG" sz="1781" dirty="0"/>
           </a:p>
         </p:txBody>
       </p:sp>
@@ -18543,7 +18549,7 @@
         </p:nvCxnSpPr>
         <p:spPr>
           <a:xfrm>
-            <a:off x="457200" y="1981200"/>
+            <a:off x="457202" y="1981200"/>
             <a:ext cx="1943099" cy="0"/>
           </a:xfrm>
           <a:prstGeom prst="line">
@@ -18588,7 +18594,7 @@
         <p:spPr>
           <a:xfrm>
             <a:off x="609600" y="1611868"/>
-            <a:ext cx="1752595" cy="369332"/>
+            <a:ext cx="1752595" cy="369204"/>
           </a:xfrm>
           <a:prstGeom prst="rect">
             <a:avLst/>
@@ -18605,7 +18611,7 @@
           <a:lstStyle/>
           <a:p>
             <a:r>
-              <a:rPr lang="en-SG" dirty="0" err="1">
+              <a:rPr lang="en-SG" sz="1781" dirty="0" err="1">
                 <a:solidFill>
                   <a:srgbClr val="00B050"/>
                 </a:solidFill>
@@ -18613,7 +18619,7 @@
               <a:t>AddCommand</a:t>
             </a:r>
             <a:r>
-              <a:rPr lang="en-SG" dirty="0">
+              <a:rPr lang="en-SG" sz="1781" dirty="0">
                 <a:solidFill>
                   <a:srgbClr val="00B050"/>
                 </a:solidFill>
@@ -18639,7 +18645,7 @@
         </p:nvCxnSpPr>
         <p:spPr>
           <a:xfrm>
-            <a:off x="2666959" y="2133600"/>
+            <a:off x="2666963" y="2133600"/>
             <a:ext cx="2514641" cy="0"/>
           </a:xfrm>
           <a:prstGeom prst="line">
@@ -18685,8 +18691,8 @@
         </p:nvSpPr>
         <p:spPr>
           <a:xfrm>
-            <a:off x="3257552" y="1676400"/>
-            <a:ext cx="1371596" cy="461665"/>
+            <a:off x="3257552" y="1676402"/>
+            <a:ext cx="1371596" cy="469076"/>
           </a:xfrm>
           <a:prstGeom prst="rect">
             <a:avLst/>
@@ -18729,7 +18735,7 @@
         </p:nvSpPr>
         <p:spPr>
           <a:xfrm rot="5400000">
-            <a:off x="6253453" y="2547683"/>
+            <a:off x="6253457" y="2547685"/>
             <a:ext cx="485229" cy="266662"/>
           </a:xfrm>
           <a:prstGeom prst="rect">
@@ -18785,7 +18791,7 @@
         </p:nvCxnSpPr>
         <p:spPr>
           <a:xfrm>
-            <a:off x="6491874" y="4058467"/>
+            <a:off x="6491874" y="4058471"/>
             <a:ext cx="0" cy="2647133"/>
           </a:xfrm>
           <a:prstGeom prst="line">
@@ -18967,7 +18973,7 @@
         </p:nvSpPr>
         <p:spPr>
           <a:xfrm>
-            <a:off x="2845428" y="3581400"/>
+            <a:off x="2845428" y="3581404"/>
             <a:ext cx="2514600" cy="513255"/>
           </a:xfrm>
           <a:prstGeom prst="rect">
@@ -19033,7 +19039,7 @@
         </p:nvSpPr>
         <p:spPr>
           <a:xfrm rot="5400000">
-            <a:off x="3759887" y="4228025"/>
+            <a:off x="3759887" y="4228027"/>
             <a:ext cx="533400" cy="266661"/>
           </a:xfrm>
           <a:prstGeom prst="rect">
@@ -19089,7 +19095,7 @@
         </p:nvCxnSpPr>
         <p:spPr>
           <a:xfrm flipH="1">
-            <a:off x="2666959" y="4648200"/>
+            <a:off x="2666963" y="4648200"/>
             <a:ext cx="1226297" cy="0"/>
           </a:xfrm>
           <a:prstGeom prst="line">
@@ -19137,7 +19143,7 @@
         </p:nvCxnSpPr>
         <p:spPr>
           <a:xfrm>
-            <a:off x="4038600" y="4640179"/>
+            <a:off x="4038600" y="4640184"/>
             <a:ext cx="0" cy="389021"/>
           </a:xfrm>
           <a:prstGeom prst="line">
@@ -19237,7 +19243,7 @@
         </p:nvCxnSpPr>
         <p:spPr>
           <a:xfrm flipH="1">
-            <a:off x="2666959" y="5574724"/>
+            <a:off x="2666961" y="5574724"/>
             <a:ext cx="1226297" cy="0"/>
           </a:xfrm>
           <a:prstGeom prst="line">
@@ -19318,7 +19324,7 @@
           <a:p>
             <a:pPr algn="ctr"/>
             <a:r>
-              <a:rPr lang="en-SG" dirty="0">
+              <a:rPr lang="en-SG" sz="1781" dirty="0">
                 <a:solidFill>
                   <a:schemeClr val="accent6"/>
                 </a:solidFill>
@@ -19342,7 +19348,7 @@
         </p:nvSpPr>
         <p:spPr>
           <a:xfrm>
-            <a:off x="4336243" y="4416623"/>
+            <a:off x="4336243" y="4416625"/>
             <a:ext cx="1619248" cy="307777"/>
           </a:xfrm>
           <a:prstGeom prst="rect">
@@ -19384,8 +19390,8 @@
         </p:nvSpPr>
         <p:spPr>
           <a:xfrm>
-            <a:off x="4146867" y="5209401"/>
-            <a:ext cx="2330133" cy="276999"/>
+            <a:off x="4146867" y="5209404"/>
+            <a:ext cx="2330133" cy="281445"/>
           </a:xfrm>
           <a:prstGeom prst="rect">
             <a:avLst/>
@@ -19472,7 +19478,7 @@
         </p:nvSpPr>
         <p:spPr>
           <a:xfrm rot="5400000">
-            <a:off x="6253451" y="3686640"/>
+            <a:off x="6253455" y="3686642"/>
             <a:ext cx="485229" cy="266662"/>
           </a:xfrm>
           <a:prstGeom prst="rect">
@@ -19528,7 +19534,7 @@
         </p:nvCxnSpPr>
         <p:spPr>
           <a:xfrm flipH="1">
-            <a:off x="2666959" y="2919572"/>
+            <a:off x="2666963" y="2919572"/>
             <a:ext cx="3705815" cy="0"/>
           </a:xfrm>
           <a:prstGeom prst="line">
@@ -19574,8 +19580,8 @@
         </p:nvSpPr>
         <p:spPr>
           <a:xfrm>
-            <a:off x="4958847" y="4169489"/>
-            <a:ext cx="497798" cy="307777"/>
+            <a:off x="4958849" y="4169492"/>
+            <a:ext cx="497798" cy="312718"/>
           </a:xfrm>
           <a:prstGeom prst="rect">
             <a:avLst/>
@@ -19616,8 +19622,8 @@
         </p:nvSpPr>
         <p:spPr>
           <a:xfrm>
-            <a:off x="4864579" y="4940752"/>
-            <a:ext cx="657211" cy="307777"/>
+            <a:off x="4864581" y="4940756"/>
+            <a:ext cx="657211" cy="312718"/>
           </a:xfrm>
           <a:prstGeom prst="rect">
             <a:avLst/>

</xml_diff>

<commit_message>
Corrected Main Class Diagram for DG
</commit_message>
<xml_diff>
--- a/docs/Diagrams.pptx
+++ b/docs/Diagrams.pptx
@@ -213,7 +213,7 @@
           <a:p>
             <a:fld id="{F5CC4B3F-88C1-4FFA-B1B6-F41C21DC6924}" type="datetimeFigureOut">
               <a:rPr lang="en-US" smtClean="0"/>
-              <a:t>11/11/2018</a:t>
+              <a:t>11/12/2018</a:t>
             </a:fld>
             <a:endParaRPr lang="en-US"/>
           </a:p>
@@ -847,7 +847,7 @@
           <a:p>
             <a:fld id="{78C97017-6FC3-485B-9764-EAC9E56C1D49}" type="datetimeFigureOut">
               <a:rPr lang="en-US" smtClean="0"/>
-              <a:t>11/11/2018</a:t>
+              <a:t>11/12/2018</a:t>
             </a:fld>
             <a:endParaRPr lang="en-US"/>
           </a:p>
@@ -1015,7 +1015,7 @@
           <a:p>
             <a:fld id="{78C97017-6FC3-485B-9764-EAC9E56C1D49}" type="datetimeFigureOut">
               <a:rPr lang="en-US" smtClean="0"/>
-              <a:t>11/11/2018</a:t>
+              <a:t>11/12/2018</a:t>
             </a:fld>
             <a:endParaRPr lang="en-US"/>
           </a:p>
@@ -1193,7 +1193,7 @@
           <a:p>
             <a:fld id="{78C97017-6FC3-485B-9764-EAC9E56C1D49}" type="datetimeFigureOut">
               <a:rPr lang="en-US" smtClean="0"/>
-              <a:t>11/11/2018</a:t>
+              <a:t>11/12/2018</a:t>
             </a:fld>
             <a:endParaRPr lang="en-US"/>
           </a:p>
@@ -1361,7 +1361,7 @@
           <a:p>
             <a:fld id="{78C97017-6FC3-485B-9764-EAC9E56C1D49}" type="datetimeFigureOut">
               <a:rPr lang="en-US" smtClean="0"/>
-              <a:t>11/11/2018</a:t>
+              <a:t>11/12/2018</a:t>
             </a:fld>
             <a:endParaRPr lang="en-US"/>
           </a:p>
@@ -1606,7 +1606,7 @@
           <a:p>
             <a:fld id="{78C97017-6FC3-485B-9764-EAC9E56C1D49}" type="datetimeFigureOut">
               <a:rPr lang="en-US" smtClean="0"/>
-              <a:t>11/11/2018</a:t>
+              <a:t>11/12/2018</a:t>
             </a:fld>
             <a:endParaRPr lang="en-US"/>
           </a:p>
@@ -1891,7 +1891,7 @@
           <a:p>
             <a:fld id="{78C97017-6FC3-485B-9764-EAC9E56C1D49}" type="datetimeFigureOut">
               <a:rPr lang="en-US" smtClean="0"/>
-              <a:t>11/11/2018</a:t>
+              <a:t>11/12/2018</a:t>
             </a:fld>
             <a:endParaRPr lang="en-US"/>
           </a:p>
@@ -2310,7 +2310,7 @@
           <a:p>
             <a:fld id="{78C97017-6FC3-485B-9764-EAC9E56C1D49}" type="datetimeFigureOut">
               <a:rPr lang="en-US" smtClean="0"/>
-              <a:t>11/11/2018</a:t>
+              <a:t>11/12/2018</a:t>
             </a:fld>
             <a:endParaRPr lang="en-US"/>
           </a:p>
@@ -2427,7 +2427,7 @@
           <a:p>
             <a:fld id="{78C97017-6FC3-485B-9764-EAC9E56C1D49}" type="datetimeFigureOut">
               <a:rPr lang="en-US" smtClean="0"/>
-              <a:t>11/11/2018</a:t>
+              <a:t>11/12/2018</a:t>
             </a:fld>
             <a:endParaRPr lang="en-US"/>
           </a:p>
@@ -2522,7 +2522,7 @@
           <a:p>
             <a:fld id="{78C97017-6FC3-485B-9764-EAC9E56C1D49}" type="datetimeFigureOut">
               <a:rPr lang="en-US" smtClean="0"/>
-              <a:t>11/11/2018</a:t>
+              <a:t>11/12/2018</a:t>
             </a:fld>
             <a:endParaRPr lang="en-US"/>
           </a:p>
@@ -2797,7 +2797,7 @@
           <a:p>
             <a:fld id="{78C97017-6FC3-485B-9764-EAC9E56C1D49}" type="datetimeFigureOut">
               <a:rPr lang="en-US" smtClean="0"/>
-              <a:t>11/11/2018</a:t>
+              <a:t>11/12/2018</a:t>
             </a:fld>
             <a:endParaRPr lang="en-US"/>
           </a:p>
@@ -3049,7 +3049,7 @@
           <a:p>
             <a:fld id="{78C97017-6FC3-485B-9764-EAC9E56C1D49}" type="datetimeFigureOut">
               <a:rPr lang="en-US" smtClean="0"/>
-              <a:t>11/11/2018</a:t>
+              <a:t>11/12/2018</a:t>
             </a:fld>
             <a:endParaRPr lang="en-US"/>
           </a:p>
@@ -3260,7 +3260,7 @@
           <a:p>
             <a:fld id="{78C97017-6FC3-485B-9764-EAC9E56C1D49}" type="datetimeFigureOut">
               <a:rPr lang="en-US" smtClean="0"/>
-              <a:t>11/11/2018</a:t>
+              <a:t>11/12/2018</a:t>
             </a:fld>
             <a:endParaRPr lang="en-US"/>
           </a:p>
@@ -9802,7 +9802,7 @@
             <a:pPr algn="ctr"/>
             <a:r>
               <a:rPr lang="en-US" sz="788" dirty="0" err="1"/>
-              <a:t>CrearCommand</a:t>
+              <a:t>ClearCommand</a:t>
             </a:r>
             <a:endParaRPr lang="en-SG" sz="788" dirty="0"/>
           </a:p>

</xml_diff>

<commit_message>
Edited main class diagram
</commit_message>
<xml_diff>
--- a/docs/Diagrams.pptx
+++ b/docs/Diagrams.pptx
@@ -5082,7 +5082,7 @@
           <a:p>
             <a:pPr algn="ctr"/>
             <a:r>
-              <a:rPr lang="en-US" sz="1050" dirty="0" err="1"/>
+              <a:rPr lang="en-US" sz="1050" dirty="0"/>
               <a:t>AddCommand</a:t>
             </a:r>
             <a:endParaRPr lang="en-SG" sz="1050" dirty="0"/>
@@ -5170,7 +5170,7 @@
           <a:p>
             <a:pPr algn="ctr"/>
             <a:r>
-              <a:rPr lang="en-US" sz="1050" dirty="0" err="1"/>
+              <a:rPr lang="en-US" sz="1050" dirty="0"/>
               <a:t>IncorrectCommand</a:t>
             </a:r>
             <a:endParaRPr lang="en-SG" sz="1050" dirty="0"/>
@@ -9757,7 +9757,7 @@
           <a:p>
             <a:pPr algn="ctr"/>
             <a:r>
-              <a:rPr lang="en-US" sz="788" dirty="0" err="1"/>
+              <a:rPr lang="en-US" sz="788" dirty="0"/>
               <a:t>AddCommand</a:t>
             </a:r>
             <a:endParaRPr lang="en-SG" sz="788" dirty="0"/>
@@ -9801,7 +9801,7 @@
           <a:p>
             <a:pPr algn="ctr"/>
             <a:r>
-              <a:rPr lang="en-US" sz="788" dirty="0" err="1"/>
+              <a:rPr lang="en-US" sz="788" dirty="0"/>
               <a:t>ClearCommand</a:t>
             </a:r>
             <a:endParaRPr lang="en-SG" sz="788" dirty="0"/>
@@ -9845,7 +9845,7 @@
           <a:p>
             <a:pPr algn="ctr"/>
             <a:r>
-              <a:rPr lang="en-US" sz="788" dirty="0" err="1"/>
+              <a:rPr lang="en-US" sz="788" dirty="0"/>
               <a:t>IncorrectCommand</a:t>
             </a:r>
             <a:endParaRPr lang="en-SG" sz="788" dirty="0"/>
@@ -12501,20 +12501,8 @@
           <a:p>
             <a:pPr algn="ctr"/>
             <a:r>
-              <a:rPr lang="en-US" sz="788" dirty="0" err="1"/>
-              <a:t>RequestBackup</a:t>
-            </a:r>
-            <a:r>
               <a:rPr lang="en-US" sz="788" dirty="0"/>
-              <a:t> (</a:t>
-            </a:r>
-            <a:r>
-              <a:rPr lang="en-US" sz="788" dirty="0" err="1"/>
-              <a:t>rb</a:t>
-            </a:r>
-            <a:r>
-              <a:rPr lang="en-US" sz="788" dirty="0"/>
-              <a:t>) Command</a:t>
+              <a:t>RequestBackup (rb) Command</a:t>
             </a:r>
             <a:endParaRPr lang="en-SG" sz="788" dirty="0"/>
           </a:p>
@@ -12563,10 +12551,9 @@
           <a:p>
             <a:pPr algn="ctr"/>
             <a:r>
-              <a:rPr lang="en-SG" sz="788" dirty="0" err="1"/>
+              <a:rPr lang="en-SG" sz="788" dirty="0"/>
               <a:t>DispatchCommand</a:t>
             </a:r>
-            <a:endParaRPr lang="en-SG" sz="788" dirty="0"/>
           </a:p>
         </p:txBody>
       </p:sp>
@@ -12613,12 +12600,8 @@
           <a:p>
             <a:pPr algn="ctr"/>
             <a:r>
-              <a:rPr lang="en-SG" sz="788" dirty="0" err="1"/>
-              <a:t>ShowUnread</a:t>
-            </a:r>
-            <a:r>
               <a:rPr lang="en-SG" sz="788" dirty="0"/>
-              <a:t> Command</a:t>
+              <a:t>ShowUnread Command</a:t>
             </a:r>
           </a:p>
         </p:txBody>
@@ -12666,10 +12649,9 @@
           <a:p>
             <a:pPr algn="ctr"/>
             <a:r>
-              <a:rPr lang="en-SG" sz="788" dirty="0" err="1"/>
+              <a:rPr lang="en-SG" sz="788" dirty="0"/>
               <a:t>InboxCommand</a:t>
             </a:r>
-            <a:endParaRPr lang="en-SG" sz="788" dirty="0"/>
           </a:p>
         </p:txBody>
       </p:sp>
@@ -12716,10 +12698,9 @@
           <a:p>
             <a:pPr algn="ctr"/>
             <a:r>
-              <a:rPr lang="en-SG" sz="788" dirty="0" err="1"/>
+              <a:rPr lang="en-SG" sz="788" dirty="0"/>
               <a:t>ReadCommand</a:t>
             </a:r>
-            <a:endParaRPr lang="en-SG" sz="788" dirty="0"/>
           </a:p>
         </p:txBody>
       </p:sp>

</xml_diff>